<commit_message>
update ppt and report
add lstm and bilstm
</commit_message>
<xml_diff>
--- a/518030990014.pptx
+++ b/518030990014.pptx
@@ -14,8 +14,17 @@
     <p:sldId id="279" r:id="rId8"/>
     <p:sldId id="281" r:id="rId9"/>
     <p:sldId id="282" r:id="rId10"/>
-    <p:sldId id="274" r:id="rId11"/>
-    <p:sldId id="280" r:id="rId12"/>
+    <p:sldId id="283" r:id="rId11"/>
+    <p:sldId id="284" r:id="rId12"/>
+    <p:sldId id="285" r:id="rId13"/>
+    <p:sldId id="286" r:id="rId14"/>
+    <p:sldId id="288" r:id="rId15"/>
+    <p:sldId id="289" r:id="rId16"/>
+    <p:sldId id="287" r:id="rId17"/>
+    <p:sldId id="290" r:id="rId18"/>
+    <p:sldId id="291" r:id="rId19"/>
+    <p:sldId id="274" r:id="rId20"/>
+    <p:sldId id="280" r:id="rId21"/>
   </p:sldIdLst>
   <p:sldSz cx="12192000" cy="6858000"/>
   <p:notesSz cx="6858000" cy="9144000"/>
@@ -5898,7 +5907,20 @@
           <a:p>
             <a:r>
               <a:rPr lang="en-MY" dirty="0"/>
-              <a:t>Other group members: EDUARDO WANG ZHENG, </a:t>
+              <a:t>Other group members: EDUARDO WANG ZHENG </a:t>
+            </a:r>
+            <a:r>
+              <a:rPr lang="en-MY" sz="1800" dirty="0">
+                <a:effectLst/>
+                <a:latin typeface="SimHei" panose="02010609060101010101" pitchFamily="49" charset="-122"/>
+                <a:ea typeface="DengXian" panose="02010600030101010101" pitchFamily="2" charset="-122"/>
+                <a:cs typeface="Times New Roman" panose="02020603050405020304" pitchFamily="18" charset="0"/>
+              </a:rPr>
+              <a:t>518030990025</a:t>
+            </a:r>
+            <a:r>
+              <a:rPr lang="en-MY" dirty="0"/>
+              <a:t>, </a:t>
             </a:r>
           </a:p>
           <a:p>
@@ -5944,7 +5966,7 @@
           <p:cNvPr id="2" name="Title 1">
             <a:extLst>
               <a:ext uri="{FF2B5EF4-FFF2-40B4-BE49-F238E27FC236}">
-                <a16:creationId xmlns:a16="http://schemas.microsoft.com/office/drawing/2014/main" id="{EF8EB9E3-ADAA-4D6C-9F1D-BE1D244915C5}"/>
+                <a16:creationId xmlns:a16="http://schemas.microsoft.com/office/drawing/2014/main" id="{9E8DE958-F766-43C9-A90E-7DB421810679}"/>
               </a:ext>
             </a:extLst>
           </p:cNvPr>
@@ -5961,9 +5983,10 @@
           <a:lstStyle/>
           <a:p>
             <a:r>
-              <a:rPr lang="en-MY" dirty="0"/>
-              <a:t>Contributions</a:t>
-            </a:r>
+              <a:rPr lang="en-US" altLang="zh-CN" dirty="0"/>
+              <a:t>Performance</a:t>
+            </a:r>
+            <a:endParaRPr lang="en-MY" dirty="0"/>
           </a:p>
         </p:txBody>
       </p:sp>
@@ -5972,7 +5995,7 @@
           <p:cNvPr id="3" name="Content Placeholder 2">
             <a:extLst>
               <a:ext uri="{FF2B5EF4-FFF2-40B4-BE49-F238E27FC236}">
-                <a16:creationId xmlns:a16="http://schemas.microsoft.com/office/drawing/2014/main" id="{C5518FFE-CD7C-49A5-B5C6-324FC9F30D6A}"/>
+                <a16:creationId xmlns:a16="http://schemas.microsoft.com/office/drawing/2014/main" id="{C98048D2-4401-4A54-826E-53EBE8361D2E}"/>
               </a:ext>
             </a:extLst>
           </p:cNvPr>
@@ -5985,135 +6008,26 @@
         </p:nvSpPr>
         <p:spPr/>
         <p:txBody>
-          <a:bodyPr>
-            <a:normAutofit fontScale="92500" lnSpcReduction="20000"/>
-          </a:bodyPr>
-          <a:lstStyle/>
-          <a:p>
-            <a:r>
-              <a:rPr lang="en-MY" sz="2000" dirty="0"/>
-              <a:t>KAR CHUN TEONG</a:t>
-            </a:r>
-          </a:p>
-          <a:p>
-            <a:pPr lvl="1"/>
-            <a:r>
-              <a:rPr lang="en-MY" altLang="zh-CN" sz="2000" dirty="0"/>
-              <a:t>Production management(organization and distribution of workload, arrangement of meeting schedule, etc.)</a:t>
-            </a:r>
-          </a:p>
-          <a:p>
-            <a:pPr lvl="1"/>
-            <a:r>
-              <a:rPr lang="en-MY" sz="2000" dirty="0"/>
-              <a:t>Research and implementation of </a:t>
-            </a:r>
-            <a:r>
-              <a:rPr lang="en-MY" sz="2000" dirty="0" err="1"/>
-              <a:t>DMRNets</a:t>
-            </a:r>
-            <a:r>
-              <a:rPr lang="en-MY" sz="2000" dirty="0"/>
-              <a:t>(FCN) model</a:t>
-            </a:r>
-          </a:p>
-          <a:p>
-            <a:pPr lvl="1"/>
-            <a:r>
-              <a:rPr lang="en-MY" sz="2000" dirty="0"/>
-              <a:t>Design, creation, and compilation of final report and PPT</a:t>
-            </a:r>
-          </a:p>
-          <a:p>
-            <a:r>
-              <a:rPr lang="en-MY" altLang="zh-CN" sz="2000" dirty="0"/>
-              <a:t>MATSUNAGA TAKEHIRO</a:t>
-            </a:r>
-          </a:p>
-          <a:p>
-            <a:pPr lvl="1"/>
-            <a:r>
-              <a:rPr lang="en-MY" altLang="zh-CN" sz="2000" dirty="0"/>
-              <a:t>Implementation of LSTM model</a:t>
-            </a:r>
-          </a:p>
-          <a:p>
-            <a:pPr lvl="1"/>
-            <a:r>
-              <a:rPr lang="en-MY" altLang="zh-CN" sz="2000" dirty="0"/>
-              <a:t>Training and testing of LSTM model</a:t>
-            </a:r>
-          </a:p>
-          <a:p>
-            <a:r>
-              <a:rPr lang="en-MY" altLang="zh-CN" sz="2000" dirty="0"/>
-              <a:t>EDUARDO</a:t>
-            </a:r>
-            <a:r>
-              <a:rPr lang="zh-CN" altLang="en-US" sz="2000" dirty="0"/>
-              <a:t> </a:t>
-            </a:r>
-            <a:r>
-              <a:rPr lang="en-MY" altLang="zh-CN" sz="2000" dirty="0"/>
-              <a:t>WANG</a:t>
-            </a:r>
-            <a:r>
-              <a:rPr lang="zh-CN" altLang="en-US" sz="2000" dirty="0"/>
-              <a:t> </a:t>
-            </a:r>
-            <a:r>
-              <a:rPr lang="en-MY" altLang="zh-CN" sz="2000" dirty="0"/>
-              <a:t>ZHENG</a:t>
-            </a:r>
-          </a:p>
-          <a:p>
-            <a:pPr lvl="1"/>
-            <a:r>
-              <a:rPr lang="en-MY" altLang="zh-CN" sz="1800" dirty="0"/>
-              <a:t>Implementation of </a:t>
-            </a:r>
-            <a:r>
-              <a:rPr lang="en-MY" altLang="zh-CN" sz="1800" dirty="0" err="1"/>
-              <a:t>DMRNets</a:t>
-            </a:r>
-            <a:r>
-              <a:rPr lang="en-MY" sz="1800" dirty="0"/>
-              <a:t>(FCN)</a:t>
-            </a:r>
-            <a:r>
-              <a:rPr lang="en-MY" altLang="zh-CN" sz="1800" dirty="0"/>
-              <a:t> model</a:t>
-            </a:r>
-          </a:p>
-          <a:p>
-            <a:pPr lvl="1"/>
-            <a:r>
-              <a:rPr lang="en-MY" altLang="zh-CN" sz="1800" dirty="0"/>
-              <a:t>Training and testing of </a:t>
-            </a:r>
-            <a:r>
-              <a:rPr lang="en-MY" altLang="zh-CN" sz="1800" dirty="0" err="1"/>
-              <a:t>DMRNets</a:t>
-            </a:r>
-            <a:r>
-              <a:rPr lang="en-MY" sz="1800" dirty="0"/>
-              <a:t>(FCN)</a:t>
-            </a:r>
-            <a:r>
-              <a:rPr lang="en-MY" altLang="zh-CN" sz="1800" dirty="0"/>
-              <a:t> model</a:t>
-            </a:r>
-          </a:p>
-          <a:p>
-            <a:pPr lvl="1"/>
-            <a:endParaRPr lang="en-MY" dirty="0"/>
+          <a:bodyPr/>
+          <a:lstStyle/>
+          <a:p>
+            <a:r>
+              <a:rPr lang="en-MY" dirty="0"/>
+              <a:t>Small datasets MAP@10: </a:t>
+            </a:r>
+          </a:p>
+          <a:p>
+            <a:r>
+              <a:rPr lang="en-MY" dirty="0"/>
+              <a:t>Whole datasets MAP@10: </a:t>
+            </a:r>
           </a:p>
         </p:txBody>
       </p:sp>
     </p:spTree>
     <p:extLst>
       <p:ext uri="{BB962C8B-B14F-4D97-AF65-F5344CB8AC3E}">
-        <p14:creationId xmlns:p14="http://schemas.microsoft.com/office/powerpoint/2010/main" val="634147495"/>
+        <p14:creationId xmlns:p14="http://schemas.microsoft.com/office/powerpoint/2010/main" val="3229893653"/>
       </p:ext>
     </p:extLst>
   </p:cSld>
@@ -6163,7 +6077,7 @@
           <a:p>
             <a:r>
               <a:rPr lang="en-MY" altLang="zh-CN" dirty="0"/>
-              <a:t>Thank you for listening!</a:t>
+              <a:t>Model Overview</a:t>
             </a:r>
             <a:endParaRPr lang="en-MY" dirty="0"/>
           </a:p>
@@ -6187,12 +6101,20 @@
         </p:nvSpPr>
         <p:spPr/>
         <p:txBody>
-          <a:bodyPr/>
-          <a:lstStyle/>
-          <a:p>
-            <a:r>
-              <a:rPr lang="en-MY" sz="1600" dirty="0"/>
-              <a:t>This presentation is made, designed and brought to you by KAR CHUN TEONG. </a:t>
+          <a:bodyPr>
+            <a:normAutofit fontScale="70000" lnSpcReduction="20000"/>
+          </a:bodyPr>
+          <a:lstStyle/>
+          <a:p>
+            <a:r>
+              <a:rPr lang="en-MY" sz="4800" dirty="0"/>
+              <a:t>LSTM</a:t>
+            </a:r>
+          </a:p>
+          <a:p>
+            <a:r>
+              <a:rPr lang="en-MY" sz="3200" dirty="0"/>
+              <a:t>*Analysed and implemented by TAKEHIRO MATSUNAGA</a:t>
             </a:r>
           </a:p>
         </p:txBody>
@@ -6200,7 +6122,1100 @@
     </p:spTree>
     <p:extLst>
       <p:ext uri="{BB962C8B-B14F-4D97-AF65-F5344CB8AC3E}">
-        <p14:creationId xmlns:p14="http://schemas.microsoft.com/office/powerpoint/2010/main" val="1089557770"/>
+        <p14:creationId xmlns:p14="http://schemas.microsoft.com/office/powerpoint/2010/main" val="1560932757"/>
+      </p:ext>
+    </p:extLst>
+  </p:cSld>
+  <p:clrMapOvr>
+    <a:masterClrMapping/>
+  </p:clrMapOvr>
+</p:sld>
+</file>
+
+<file path=ppt/slides/slide12.xml><?xml version="1.0" encoding="utf-8"?>
+<p:sld xmlns:a="http://schemas.openxmlformats.org/drawingml/2006/main" xmlns:r="http://schemas.openxmlformats.org/officeDocument/2006/relationships" xmlns:p="http://schemas.openxmlformats.org/presentationml/2006/main">
+  <p:cSld>
+    <p:spTree>
+      <p:nvGrpSpPr>
+        <p:cNvPr id="1" name=""/>
+        <p:cNvGrpSpPr/>
+        <p:nvPr/>
+      </p:nvGrpSpPr>
+      <p:grpSpPr>
+        <a:xfrm>
+          <a:off x="0" y="0"/>
+          <a:ext cx="0" cy="0"/>
+          <a:chOff x="0" y="0"/>
+          <a:chExt cx="0" cy="0"/>
+        </a:xfrm>
+      </p:grpSpPr>
+      <p:sp>
+        <p:nvSpPr>
+          <p:cNvPr id="2" name="Title 1">
+            <a:extLst>
+              <a:ext uri="{FF2B5EF4-FFF2-40B4-BE49-F238E27FC236}">
+                <a16:creationId xmlns:a16="http://schemas.microsoft.com/office/drawing/2014/main" id="{21FF45D8-377F-4CC2-8AE3-CA1A9D3AE3BE}"/>
+              </a:ext>
+            </a:extLst>
+          </p:cNvPr>
+          <p:cNvSpPr>
+            <a:spLocks noGrp="1"/>
+          </p:cNvSpPr>
+          <p:nvPr>
+            <p:ph type="title"/>
+          </p:nvPr>
+        </p:nvSpPr>
+        <p:spPr/>
+        <p:txBody>
+          <a:bodyPr/>
+          <a:lstStyle/>
+          <a:p>
+            <a:r>
+              <a:rPr lang="en-MY" dirty="0"/>
+              <a:t>What is LSTM?</a:t>
+            </a:r>
+          </a:p>
+        </p:txBody>
+      </p:sp>
+      <p:sp>
+        <p:nvSpPr>
+          <p:cNvPr id="3" name="Content Placeholder 2">
+            <a:extLst>
+              <a:ext uri="{FF2B5EF4-FFF2-40B4-BE49-F238E27FC236}">
+                <a16:creationId xmlns:a16="http://schemas.microsoft.com/office/drawing/2014/main" id="{C0E7BA72-9E50-499E-90A3-5D9086B36678}"/>
+              </a:ext>
+            </a:extLst>
+          </p:cNvPr>
+          <p:cNvSpPr>
+            <a:spLocks noGrp="1"/>
+          </p:cNvSpPr>
+          <p:nvPr>
+            <p:ph idx="1"/>
+          </p:nvPr>
+        </p:nvSpPr>
+        <p:spPr/>
+        <p:txBody>
+          <a:bodyPr/>
+          <a:lstStyle/>
+          <a:p>
+            <a:r>
+              <a:rPr lang="en-MY" dirty="0">
+                <a:solidFill>
+                  <a:schemeClr val="tx1"/>
+                </a:solidFill>
+              </a:rPr>
+              <a:t>A type of </a:t>
+            </a:r>
+            <a:r>
+              <a:rPr lang="en-US" dirty="0">
+                <a:solidFill>
+                  <a:schemeClr val="tx1"/>
+                </a:solidFill>
+                <a:effectLst/>
+                <a:latin typeface="Arial" panose="020B0604020202020204" pitchFamily="34" charset="0"/>
+              </a:rPr>
+              <a:t>recurrent neural network (RNN) architecture. </a:t>
+            </a:r>
+          </a:p>
+          <a:p>
+            <a:r>
+              <a:rPr lang="en-US" dirty="0">
+                <a:solidFill>
+                  <a:srgbClr val="202122"/>
+                </a:solidFill>
+                <a:effectLst/>
+                <a:latin typeface="Arial" panose="020B0604020202020204" pitchFamily="34" charset="0"/>
+              </a:rPr>
+              <a:t>A common LSTM unit is composed of:</a:t>
+            </a:r>
+          </a:p>
+          <a:p>
+            <a:pPr lvl="1"/>
+            <a:r>
+              <a:rPr lang="en-US" dirty="0">
+                <a:solidFill>
+                  <a:srgbClr val="202122"/>
+                </a:solidFill>
+                <a:effectLst/>
+                <a:latin typeface="Arial" panose="020B0604020202020204" pitchFamily="34" charset="0"/>
+              </a:rPr>
+              <a:t>a cell: remembers values over time intervals</a:t>
+            </a:r>
+          </a:p>
+          <a:p>
+            <a:pPr lvl="1"/>
+            <a:r>
+              <a:rPr lang="en-US" dirty="0">
+                <a:solidFill>
+                  <a:srgbClr val="202122"/>
+                </a:solidFill>
+                <a:latin typeface="Arial" panose="020B0604020202020204" pitchFamily="34" charset="0"/>
+              </a:rPr>
+              <a:t>3 gates to </a:t>
+            </a:r>
+            <a:r>
+              <a:rPr lang="en-US" sz="1600" dirty="0">
+                <a:solidFill>
+                  <a:srgbClr val="202122"/>
+                </a:solidFill>
+                <a:effectLst/>
+                <a:latin typeface="Arial" panose="020B0604020202020204" pitchFamily="34" charset="0"/>
+              </a:rPr>
+              <a:t>regulate the flow of information into and out of the cell.</a:t>
+            </a:r>
+          </a:p>
+          <a:p>
+            <a:pPr lvl="2"/>
+            <a:r>
+              <a:rPr lang="en-US" dirty="0">
+                <a:solidFill>
+                  <a:srgbClr val="202122"/>
+                </a:solidFill>
+                <a:effectLst/>
+                <a:latin typeface="Arial" panose="020B0604020202020204" pitchFamily="34" charset="0"/>
+              </a:rPr>
+              <a:t>forget gate: decides to forget which information.</a:t>
+            </a:r>
+          </a:p>
+          <a:p>
+            <a:pPr lvl="2"/>
+            <a:r>
+              <a:rPr lang="en-US" dirty="0">
+                <a:solidFill>
+                  <a:srgbClr val="202122"/>
+                </a:solidFill>
+                <a:effectLst/>
+                <a:latin typeface="Arial" panose="020B0604020202020204" pitchFamily="34" charset="0"/>
+              </a:rPr>
+              <a:t>input gate: decides to update which value, and update cell states.</a:t>
+            </a:r>
+          </a:p>
+          <a:p>
+            <a:pPr lvl="2"/>
+            <a:r>
+              <a:rPr lang="en-US" dirty="0">
+                <a:solidFill>
+                  <a:srgbClr val="202122"/>
+                </a:solidFill>
+                <a:effectLst/>
+                <a:latin typeface="Arial" panose="020B0604020202020204" pitchFamily="34" charset="0"/>
+              </a:rPr>
+              <a:t>output gate: output filtered cell states.</a:t>
+            </a:r>
+          </a:p>
+          <a:p>
+            <a:r>
+              <a:rPr lang="en-US" dirty="0">
+                <a:solidFill>
+                  <a:srgbClr val="202122"/>
+                </a:solidFill>
+                <a:effectLst/>
+                <a:latin typeface="Arial" panose="020B0604020202020204" pitchFamily="34" charset="0"/>
+                <a:cs typeface="Arial" panose="020B0604020202020204" pitchFamily="34" charset="0"/>
+              </a:rPr>
+              <a:t>TL;DR</a:t>
+            </a:r>
+            <a:r>
+              <a:rPr lang="en-US" dirty="0">
+                <a:solidFill>
+                  <a:srgbClr val="202122"/>
+                </a:solidFill>
+                <a:latin typeface="Arial" panose="020B0604020202020204" pitchFamily="34" charset="0"/>
+                <a:cs typeface="Arial" panose="020B0604020202020204" pitchFamily="34" charset="0"/>
+              </a:rPr>
+              <a:t>: use past context to predict the output.</a:t>
+            </a:r>
+          </a:p>
+          <a:p>
+            <a:pPr lvl="1"/>
+            <a:r>
+              <a:rPr lang="en-US" dirty="0">
+                <a:solidFill>
+                  <a:srgbClr val="202122"/>
+                </a:solidFill>
+                <a:effectLst/>
+                <a:latin typeface="Arial" panose="020B0604020202020204" pitchFamily="34" charset="0"/>
+                <a:cs typeface="Arial" panose="020B0604020202020204" pitchFamily="34" charset="0"/>
+              </a:rPr>
+              <a:t>Example: trying to predict next word based on given sentence </a:t>
+            </a:r>
+          </a:p>
+          <a:p>
+            <a:pPr lvl="1"/>
+            <a:r>
+              <a:rPr lang="en-US" dirty="0">
+                <a:solidFill>
+                  <a:srgbClr val="202122"/>
+                </a:solidFill>
+                <a:effectLst/>
+                <a:latin typeface="Arial" panose="020B0604020202020204" pitchFamily="34" charset="0"/>
+                <a:cs typeface="Arial" panose="020B0604020202020204" pitchFamily="34" charset="0"/>
+              </a:rPr>
+              <a:t>“he went to pool to …”</a:t>
+            </a:r>
+          </a:p>
+          <a:p>
+            <a:pPr lvl="1"/>
+            <a:endParaRPr lang="en-US" dirty="0">
+              <a:solidFill>
+                <a:srgbClr val="202122"/>
+              </a:solidFill>
+              <a:effectLst/>
+              <a:latin typeface="Arial" panose="020B0604020202020204" pitchFamily="34" charset="0"/>
+              <a:cs typeface="Arial" panose="020B0604020202020204" pitchFamily="34" charset="0"/>
+            </a:endParaRPr>
+          </a:p>
+        </p:txBody>
+      </p:sp>
+    </p:spTree>
+    <p:extLst>
+      <p:ext uri="{BB962C8B-B14F-4D97-AF65-F5344CB8AC3E}">
+        <p14:creationId xmlns:p14="http://schemas.microsoft.com/office/powerpoint/2010/main" val="1964593517"/>
+      </p:ext>
+    </p:extLst>
+  </p:cSld>
+  <p:clrMapOvr>
+    <a:masterClrMapping/>
+  </p:clrMapOvr>
+</p:sld>
+</file>
+
+<file path=ppt/slides/slide13.xml><?xml version="1.0" encoding="utf-8"?>
+<p:sld xmlns:a="http://schemas.openxmlformats.org/drawingml/2006/main" xmlns:r="http://schemas.openxmlformats.org/officeDocument/2006/relationships" xmlns:p="http://schemas.openxmlformats.org/presentationml/2006/main">
+  <p:cSld>
+    <p:spTree>
+      <p:nvGrpSpPr>
+        <p:cNvPr id="1" name=""/>
+        <p:cNvGrpSpPr/>
+        <p:nvPr/>
+      </p:nvGrpSpPr>
+      <p:grpSpPr>
+        <a:xfrm>
+          <a:off x="0" y="0"/>
+          <a:ext cx="0" cy="0"/>
+          <a:chOff x="0" y="0"/>
+          <a:chExt cx="0" cy="0"/>
+        </a:xfrm>
+      </p:grpSpPr>
+      <p:sp>
+        <p:nvSpPr>
+          <p:cNvPr id="2" name="Title 1">
+            <a:extLst>
+              <a:ext uri="{FF2B5EF4-FFF2-40B4-BE49-F238E27FC236}">
+                <a16:creationId xmlns:a16="http://schemas.microsoft.com/office/drawing/2014/main" id="{698E3FDA-0A18-4FE3-9B73-521B0E2E57C3}"/>
+              </a:ext>
+            </a:extLst>
+          </p:cNvPr>
+          <p:cNvSpPr>
+            <a:spLocks noGrp="1"/>
+          </p:cNvSpPr>
+          <p:nvPr>
+            <p:ph type="title"/>
+          </p:nvPr>
+        </p:nvSpPr>
+        <p:spPr/>
+        <p:txBody>
+          <a:bodyPr/>
+          <a:lstStyle/>
+          <a:p>
+            <a:endParaRPr lang="en-MY"/>
+          </a:p>
+        </p:txBody>
+      </p:sp>
+      <p:pic>
+        <p:nvPicPr>
+          <p:cNvPr id="5" name="Content Placeholder 4">
+            <a:extLst>
+              <a:ext uri="{FF2B5EF4-FFF2-40B4-BE49-F238E27FC236}">
+                <a16:creationId xmlns:a16="http://schemas.microsoft.com/office/drawing/2014/main" id="{4461B4B8-D7DD-4F55-8D7C-A42FF7538985}"/>
+              </a:ext>
+            </a:extLst>
+          </p:cNvPr>
+          <p:cNvPicPr>
+            <a:picLocks noGrp="1" noChangeAspect="1"/>
+          </p:cNvPicPr>
+          <p:nvPr>
+            <p:ph idx="1"/>
+          </p:nvPr>
+        </p:nvPicPr>
+        <p:blipFill>
+          <a:blip r:embed="rId2">
+            <a:extLst>
+              <a:ext uri="{28A0092B-C50C-407E-A947-70E740481C1C}">
+                <a14:useLocalDpi xmlns:a14="http://schemas.microsoft.com/office/drawing/2010/main" val="0"/>
+              </a:ext>
+            </a:extLst>
+          </a:blip>
+          <a:stretch>
+            <a:fillRect/>
+          </a:stretch>
+        </p:blipFill>
+        <p:spPr>
+          <a:xfrm>
+            <a:off x="2133615" y="361659"/>
+            <a:ext cx="4595088" cy="6368264"/>
+          </a:xfrm>
+        </p:spPr>
+      </p:pic>
+    </p:spTree>
+    <p:extLst>
+      <p:ext uri="{BB962C8B-B14F-4D97-AF65-F5344CB8AC3E}">
+        <p14:creationId xmlns:p14="http://schemas.microsoft.com/office/powerpoint/2010/main" val="290967866"/>
+      </p:ext>
+    </p:extLst>
+  </p:cSld>
+  <p:clrMapOvr>
+    <a:masterClrMapping/>
+  </p:clrMapOvr>
+</p:sld>
+</file>
+
+<file path=ppt/slides/slide14.xml><?xml version="1.0" encoding="utf-8"?>
+<p:sld xmlns:a="http://schemas.openxmlformats.org/drawingml/2006/main" xmlns:r="http://schemas.openxmlformats.org/officeDocument/2006/relationships" xmlns:p="http://schemas.openxmlformats.org/presentationml/2006/main">
+  <p:cSld>
+    <p:spTree>
+      <p:nvGrpSpPr>
+        <p:cNvPr id="1" name=""/>
+        <p:cNvGrpSpPr/>
+        <p:nvPr/>
+      </p:nvGrpSpPr>
+      <p:grpSpPr>
+        <a:xfrm>
+          <a:off x="0" y="0"/>
+          <a:ext cx="0" cy="0"/>
+          <a:chOff x="0" y="0"/>
+          <a:chExt cx="0" cy="0"/>
+        </a:xfrm>
+      </p:grpSpPr>
+      <p:sp>
+        <p:nvSpPr>
+          <p:cNvPr id="2" name="Title 1">
+            <a:extLst>
+              <a:ext uri="{FF2B5EF4-FFF2-40B4-BE49-F238E27FC236}">
+                <a16:creationId xmlns:a16="http://schemas.microsoft.com/office/drawing/2014/main" id="{9E8DE958-F766-43C9-A90E-7DB421810679}"/>
+              </a:ext>
+            </a:extLst>
+          </p:cNvPr>
+          <p:cNvSpPr>
+            <a:spLocks noGrp="1"/>
+          </p:cNvSpPr>
+          <p:nvPr>
+            <p:ph type="title"/>
+          </p:nvPr>
+        </p:nvSpPr>
+        <p:spPr/>
+        <p:txBody>
+          <a:bodyPr/>
+          <a:lstStyle/>
+          <a:p>
+            <a:r>
+              <a:rPr lang="en-US" altLang="zh-CN" dirty="0"/>
+              <a:t>Performance</a:t>
+            </a:r>
+            <a:endParaRPr lang="en-MY" dirty="0"/>
+          </a:p>
+        </p:txBody>
+      </p:sp>
+      <p:sp>
+        <p:nvSpPr>
+          <p:cNvPr id="3" name="Content Placeholder 2">
+            <a:extLst>
+              <a:ext uri="{FF2B5EF4-FFF2-40B4-BE49-F238E27FC236}">
+                <a16:creationId xmlns:a16="http://schemas.microsoft.com/office/drawing/2014/main" id="{C98048D2-4401-4A54-826E-53EBE8361D2E}"/>
+              </a:ext>
+            </a:extLst>
+          </p:cNvPr>
+          <p:cNvSpPr>
+            <a:spLocks noGrp="1"/>
+          </p:cNvSpPr>
+          <p:nvPr>
+            <p:ph idx="1"/>
+          </p:nvPr>
+        </p:nvSpPr>
+        <p:spPr/>
+        <p:txBody>
+          <a:bodyPr/>
+          <a:lstStyle/>
+          <a:p>
+            <a:r>
+              <a:rPr lang="en-MY" dirty="0"/>
+              <a:t>Small datasets MAP@10: </a:t>
+            </a:r>
+          </a:p>
+          <a:p>
+            <a:r>
+              <a:rPr lang="en-MY" dirty="0"/>
+              <a:t>Whole datasets MAP@10: </a:t>
+            </a:r>
+          </a:p>
+        </p:txBody>
+      </p:sp>
+    </p:spTree>
+    <p:extLst>
+      <p:ext uri="{BB962C8B-B14F-4D97-AF65-F5344CB8AC3E}">
+        <p14:creationId xmlns:p14="http://schemas.microsoft.com/office/powerpoint/2010/main" val="2488255710"/>
+      </p:ext>
+    </p:extLst>
+  </p:cSld>
+  <p:clrMapOvr>
+    <a:masterClrMapping/>
+  </p:clrMapOvr>
+</p:sld>
+</file>
+
+<file path=ppt/slides/slide15.xml><?xml version="1.0" encoding="utf-8"?>
+<p:sld xmlns:a="http://schemas.openxmlformats.org/drawingml/2006/main" xmlns:r="http://schemas.openxmlformats.org/officeDocument/2006/relationships" xmlns:p="http://schemas.openxmlformats.org/presentationml/2006/main">
+  <p:cSld>
+    <p:spTree>
+      <p:nvGrpSpPr>
+        <p:cNvPr id="1" name=""/>
+        <p:cNvGrpSpPr/>
+        <p:nvPr/>
+      </p:nvGrpSpPr>
+      <p:grpSpPr>
+        <a:xfrm>
+          <a:off x="0" y="0"/>
+          <a:ext cx="0" cy="0"/>
+          <a:chOff x="0" y="0"/>
+          <a:chExt cx="0" cy="0"/>
+        </a:xfrm>
+      </p:grpSpPr>
+      <p:sp>
+        <p:nvSpPr>
+          <p:cNvPr id="2" name="Title 1">
+            <a:extLst>
+              <a:ext uri="{FF2B5EF4-FFF2-40B4-BE49-F238E27FC236}">
+                <a16:creationId xmlns:a16="http://schemas.microsoft.com/office/drawing/2014/main" id="{13EBCDCC-AC0E-4224-98FD-2780A74AE843}"/>
+              </a:ext>
+            </a:extLst>
+          </p:cNvPr>
+          <p:cNvSpPr>
+            <a:spLocks noGrp="1"/>
+          </p:cNvSpPr>
+          <p:nvPr>
+            <p:ph type="ctrTitle"/>
+          </p:nvPr>
+        </p:nvSpPr>
+        <p:spPr/>
+        <p:txBody>
+          <a:bodyPr/>
+          <a:lstStyle/>
+          <a:p>
+            <a:r>
+              <a:rPr lang="en-MY" altLang="zh-CN" dirty="0"/>
+              <a:t>Model Overview</a:t>
+            </a:r>
+            <a:endParaRPr lang="en-MY" dirty="0"/>
+          </a:p>
+        </p:txBody>
+      </p:sp>
+      <p:sp>
+        <p:nvSpPr>
+          <p:cNvPr id="3" name="Subtitle 2">
+            <a:extLst>
+              <a:ext uri="{FF2B5EF4-FFF2-40B4-BE49-F238E27FC236}">
+                <a16:creationId xmlns:a16="http://schemas.microsoft.com/office/drawing/2014/main" id="{C8ACB5B7-FC3C-43ED-BB53-3FBA32F7AAAA}"/>
+              </a:ext>
+            </a:extLst>
+          </p:cNvPr>
+          <p:cNvSpPr>
+            <a:spLocks noGrp="1"/>
+          </p:cNvSpPr>
+          <p:nvPr>
+            <p:ph type="subTitle" idx="1"/>
+          </p:nvPr>
+        </p:nvSpPr>
+        <p:spPr/>
+        <p:txBody>
+          <a:bodyPr>
+            <a:normAutofit fontScale="70000" lnSpcReduction="20000"/>
+          </a:bodyPr>
+          <a:lstStyle/>
+          <a:p>
+            <a:r>
+              <a:rPr lang="en-MY" sz="4800" dirty="0" err="1"/>
+              <a:t>biLSTM</a:t>
+            </a:r>
+            <a:endParaRPr lang="en-MY" sz="4800" dirty="0"/>
+          </a:p>
+          <a:p>
+            <a:r>
+              <a:rPr lang="en-MY" sz="3200" dirty="0"/>
+              <a:t>*Analysed and implemented by TAKEHIRO MATSUNAGA</a:t>
+            </a:r>
+          </a:p>
+        </p:txBody>
+      </p:sp>
+    </p:spTree>
+    <p:extLst>
+      <p:ext uri="{BB962C8B-B14F-4D97-AF65-F5344CB8AC3E}">
+        <p14:creationId xmlns:p14="http://schemas.microsoft.com/office/powerpoint/2010/main" val="2616941251"/>
+      </p:ext>
+    </p:extLst>
+  </p:cSld>
+  <p:clrMapOvr>
+    <a:masterClrMapping/>
+  </p:clrMapOvr>
+</p:sld>
+</file>
+
+<file path=ppt/slides/slide16.xml><?xml version="1.0" encoding="utf-8"?>
+<p:sld xmlns:a="http://schemas.openxmlformats.org/drawingml/2006/main" xmlns:r="http://schemas.openxmlformats.org/officeDocument/2006/relationships" xmlns:p="http://schemas.openxmlformats.org/presentationml/2006/main">
+  <p:cSld>
+    <p:spTree>
+      <p:nvGrpSpPr>
+        <p:cNvPr id="1" name=""/>
+        <p:cNvGrpSpPr/>
+        <p:nvPr/>
+      </p:nvGrpSpPr>
+      <p:grpSpPr>
+        <a:xfrm>
+          <a:off x="0" y="0"/>
+          <a:ext cx="0" cy="0"/>
+          <a:chOff x="0" y="0"/>
+          <a:chExt cx="0" cy="0"/>
+        </a:xfrm>
+      </p:grpSpPr>
+      <p:sp>
+        <p:nvSpPr>
+          <p:cNvPr id="2" name="Title 1">
+            <a:extLst>
+              <a:ext uri="{FF2B5EF4-FFF2-40B4-BE49-F238E27FC236}">
+                <a16:creationId xmlns:a16="http://schemas.microsoft.com/office/drawing/2014/main" id="{DDAE0AB9-3B4D-441A-8FC9-AD5B29A3DD67}"/>
+              </a:ext>
+            </a:extLst>
+          </p:cNvPr>
+          <p:cNvSpPr>
+            <a:spLocks noGrp="1"/>
+          </p:cNvSpPr>
+          <p:nvPr>
+            <p:ph type="title"/>
+          </p:nvPr>
+        </p:nvSpPr>
+        <p:spPr/>
+        <p:txBody>
+          <a:bodyPr/>
+          <a:lstStyle/>
+          <a:p>
+            <a:r>
+              <a:rPr lang="en-MY" dirty="0"/>
+              <a:t>What is </a:t>
+            </a:r>
+            <a:r>
+              <a:rPr lang="en-MY" dirty="0" err="1"/>
+              <a:t>biLSTM</a:t>
+            </a:r>
+            <a:r>
+              <a:rPr lang="en-MY" dirty="0"/>
+              <a:t>?</a:t>
+            </a:r>
+          </a:p>
+        </p:txBody>
+      </p:sp>
+      <p:sp>
+        <p:nvSpPr>
+          <p:cNvPr id="3" name="Content Placeholder 2">
+            <a:extLst>
+              <a:ext uri="{FF2B5EF4-FFF2-40B4-BE49-F238E27FC236}">
+                <a16:creationId xmlns:a16="http://schemas.microsoft.com/office/drawing/2014/main" id="{9D62E14F-58F8-422A-8892-5DC3D258234D}"/>
+              </a:ext>
+            </a:extLst>
+          </p:cNvPr>
+          <p:cNvSpPr>
+            <a:spLocks noGrp="1"/>
+          </p:cNvSpPr>
+          <p:nvPr>
+            <p:ph idx="1"/>
+          </p:nvPr>
+        </p:nvSpPr>
+        <p:spPr/>
+        <p:txBody>
+          <a:bodyPr/>
+          <a:lstStyle/>
+          <a:p>
+            <a:r>
+              <a:rPr lang="en-MY" dirty="0"/>
+              <a:t>LSTM but in two directions.</a:t>
+            </a:r>
+          </a:p>
+          <a:p>
+            <a:pPr lvl="1"/>
+            <a:r>
+              <a:rPr lang="en-MY" dirty="0"/>
+              <a:t>LSTM uses past context only</a:t>
+            </a:r>
+          </a:p>
+          <a:p>
+            <a:pPr lvl="1"/>
+            <a:r>
+              <a:rPr lang="en-MY" dirty="0" err="1"/>
+              <a:t>biLSTM</a:t>
+            </a:r>
+            <a:r>
+              <a:rPr lang="en-MY" dirty="0"/>
+              <a:t> uses past and future context</a:t>
+            </a:r>
+          </a:p>
+          <a:p>
+            <a:r>
+              <a:rPr lang="en-MY" dirty="0"/>
+              <a:t> </a:t>
+            </a:r>
+            <a:r>
+              <a:rPr lang="en-MY" dirty="0" err="1"/>
+              <a:t>biLSTM</a:t>
+            </a:r>
+            <a:r>
+              <a:rPr lang="en-MY" dirty="0"/>
+              <a:t> generally provided more context -&gt; better performance</a:t>
+            </a:r>
+            <a:endParaRPr lang="en-US" dirty="0">
+              <a:solidFill>
+                <a:srgbClr val="202122"/>
+              </a:solidFill>
+              <a:effectLst/>
+              <a:latin typeface="Arial" panose="020B0604020202020204" pitchFamily="34" charset="0"/>
+              <a:cs typeface="Arial" panose="020B0604020202020204" pitchFamily="34" charset="0"/>
+            </a:endParaRPr>
+          </a:p>
+          <a:p>
+            <a:r>
+              <a:rPr lang="en-US" dirty="0">
+                <a:solidFill>
+                  <a:srgbClr val="202122"/>
+                </a:solidFill>
+                <a:effectLst/>
+                <a:latin typeface="Arial" panose="020B0604020202020204" pitchFamily="34" charset="0"/>
+                <a:cs typeface="Arial" panose="020B0604020202020204" pitchFamily="34" charset="0"/>
+              </a:rPr>
+              <a:t>Example: trying to predict next word based on given sentence </a:t>
+            </a:r>
+          </a:p>
+          <a:p>
+            <a:pPr lvl="1"/>
+            <a:r>
+              <a:rPr lang="en-US" dirty="0">
+                <a:solidFill>
+                  <a:srgbClr val="202122"/>
+                </a:solidFill>
+                <a:effectLst/>
+                <a:latin typeface="Arial" panose="020B0604020202020204" pitchFamily="34" charset="0"/>
+                <a:cs typeface="Arial" panose="020B0604020202020204" pitchFamily="34" charset="0"/>
+              </a:rPr>
+              <a:t>Forward LSTM: “he went to … ”</a:t>
+            </a:r>
+          </a:p>
+          <a:p>
+            <a:pPr lvl="1"/>
+            <a:r>
+              <a:rPr lang="en-US" dirty="0">
+                <a:solidFill>
+                  <a:srgbClr val="202122"/>
+                </a:solidFill>
+                <a:latin typeface="Arial" panose="020B0604020202020204" pitchFamily="34" charset="0"/>
+                <a:cs typeface="Arial" panose="020B0604020202020204" pitchFamily="34" charset="0"/>
+              </a:rPr>
+              <a:t>Backward LSTM: “… to take a shower.” </a:t>
+            </a:r>
+            <a:endParaRPr lang="en-US" dirty="0">
+              <a:solidFill>
+                <a:srgbClr val="202122"/>
+              </a:solidFill>
+              <a:effectLst/>
+              <a:latin typeface="Arial" panose="020B0604020202020204" pitchFamily="34" charset="0"/>
+              <a:cs typeface="Arial" panose="020B0604020202020204" pitchFamily="34" charset="0"/>
+            </a:endParaRPr>
+          </a:p>
+        </p:txBody>
+      </p:sp>
+    </p:spTree>
+    <p:extLst>
+      <p:ext uri="{BB962C8B-B14F-4D97-AF65-F5344CB8AC3E}">
+        <p14:creationId xmlns:p14="http://schemas.microsoft.com/office/powerpoint/2010/main" val="2230104647"/>
+      </p:ext>
+    </p:extLst>
+  </p:cSld>
+  <p:clrMapOvr>
+    <a:masterClrMapping/>
+  </p:clrMapOvr>
+</p:sld>
+</file>
+
+<file path=ppt/slides/slide17.xml><?xml version="1.0" encoding="utf-8"?>
+<p:sld xmlns:a="http://schemas.openxmlformats.org/drawingml/2006/main" xmlns:r="http://schemas.openxmlformats.org/officeDocument/2006/relationships" xmlns:p="http://schemas.openxmlformats.org/presentationml/2006/main">
+  <p:cSld>
+    <p:spTree>
+      <p:nvGrpSpPr>
+        <p:cNvPr id="1" name=""/>
+        <p:cNvGrpSpPr/>
+        <p:nvPr/>
+      </p:nvGrpSpPr>
+      <p:grpSpPr>
+        <a:xfrm>
+          <a:off x="0" y="0"/>
+          <a:ext cx="0" cy="0"/>
+          <a:chOff x="0" y="0"/>
+          <a:chExt cx="0" cy="0"/>
+        </a:xfrm>
+      </p:grpSpPr>
+      <p:sp>
+        <p:nvSpPr>
+          <p:cNvPr id="2" name="Title 1">
+            <a:extLst>
+              <a:ext uri="{FF2B5EF4-FFF2-40B4-BE49-F238E27FC236}">
+                <a16:creationId xmlns:a16="http://schemas.microsoft.com/office/drawing/2014/main" id="{C9F73ACF-E390-4297-9F14-341E666D2A63}"/>
+              </a:ext>
+            </a:extLst>
+          </p:cNvPr>
+          <p:cNvSpPr>
+            <a:spLocks noGrp="1"/>
+          </p:cNvSpPr>
+          <p:nvPr>
+            <p:ph type="title"/>
+          </p:nvPr>
+        </p:nvSpPr>
+        <p:spPr/>
+        <p:txBody>
+          <a:bodyPr/>
+          <a:lstStyle/>
+          <a:p>
+            <a:endParaRPr lang="en-MY"/>
+          </a:p>
+        </p:txBody>
+      </p:sp>
+      <p:pic>
+        <p:nvPicPr>
+          <p:cNvPr id="5" name="Content Placeholder 4">
+            <a:extLst>
+              <a:ext uri="{FF2B5EF4-FFF2-40B4-BE49-F238E27FC236}">
+                <a16:creationId xmlns:a16="http://schemas.microsoft.com/office/drawing/2014/main" id="{C198873D-3C2E-4908-922B-03979A52BEDA}"/>
+              </a:ext>
+            </a:extLst>
+          </p:cNvPr>
+          <p:cNvPicPr>
+            <a:picLocks noGrp="1" noChangeAspect="1"/>
+          </p:cNvPicPr>
+          <p:nvPr>
+            <p:ph idx="1"/>
+          </p:nvPr>
+        </p:nvPicPr>
+        <p:blipFill>
+          <a:blip r:embed="rId2">
+            <a:extLst>
+              <a:ext uri="{28A0092B-C50C-407E-A947-70E740481C1C}">
+                <a14:useLocalDpi xmlns:a14="http://schemas.microsoft.com/office/drawing/2010/main" val="0"/>
+              </a:ext>
+            </a:extLst>
+          </a:blip>
+          <a:stretch>
+            <a:fillRect/>
+          </a:stretch>
+        </p:blipFill>
+        <p:spPr>
+          <a:xfrm>
+            <a:off x="1904301" y="104775"/>
+            <a:ext cx="5260629" cy="6753225"/>
+          </a:xfrm>
+        </p:spPr>
+      </p:pic>
+    </p:spTree>
+    <p:extLst>
+      <p:ext uri="{BB962C8B-B14F-4D97-AF65-F5344CB8AC3E}">
+        <p14:creationId xmlns:p14="http://schemas.microsoft.com/office/powerpoint/2010/main" val="566476552"/>
+      </p:ext>
+    </p:extLst>
+  </p:cSld>
+  <p:clrMapOvr>
+    <a:masterClrMapping/>
+  </p:clrMapOvr>
+</p:sld>
+</file>
+
+<file path=ppt/slides/slide18.xml><?xml version="1.0" encoding="utf-8"?>
+<p:sld xmlns:a="http://schemas.openxmlformats.org/drawingml/2006/main" xmlns:r="http://schemas.openxmlformats.org/officeDocument/2006/relationships" xmlns:p="http://schemas.openxmlformats.org/presentationml/2006/main">
+  <p:cSld>
+    <p:spTree>
+      <p:nvGrpSpPr>
+        <p:cNvPr id="1" name=""/>
+        <p:cNvGrpSpPr/>
+        <p:nvPr/>
+      </p:nvGrpSpPr>
+      <p:grpSpPr>
+        <a:xfrm>
+          <a:off x="0" y="0"/>
+          <a:ext cx="0" cy="0"/>
+          <a:chOff x="0" y="0"/>
+          <a:chExt cx="0" cy="0"/>
+        </a:xfrm>
+      </p:grpSpPr>
+      <p:sp>
+        <p:nvSpPr>
+          <p:cNvPr id="2" name="Title 1">
+            <a:extLst>
+              <a:ext uri="{FF2B5EF4-FFF2-40B4-BE49-F238E27FC236}">
+                <a16:creationId xmlns:a16="http://schemas.microsoft.com/office/drawing/2014/main" id="{9E8DE958-F766-43C9-A90E-7DB421810679}"/>
+              </a:ext>
+            </a:extLst>
+          </p:cNvPr>
+          <p:cNvSpPr>
+            <a:spLocks noGrp="1"/>
+          </p:cNvSpPr>
+          <p:nvPr>
+            <p:ph type="title"/>
+          </p:nvPr>
+        </p:nvSpPr>
+        <p:spPr/>
+        <p:txBody>
+          <a:bodyPr/>
+          <a:lstStyle/>
+          <a:p>
+            <a:r>
+              <a:rPr lang="en-US" altLang="zh-CN" dirty="0"/>
+              <a:t>Performance</a:t>
+            </a:r>
+            <a:endParaRPr lang="en-MY" dirty="0"/>
+          </a:p>
+        </p:txBody>
+      </p:sp>
+      <p:sp>
+        <p:nvSpPr>
+          <p:cNvPr id="3" name="Content Placeholder 2">
+            <a:extLst>
+              <a:ext uri="{FF2B5EF4-FFF2-40B4-BE49-F238E27FC236}">
+                <a16:creationId xmlns:a16="http://schemas.microsoft.com/office/drawing/2014/main" id="{C98048D2-4401-4A54-826E-53EBE8361D2E}"/>
+              </a:ext>
+            </a:extLst>
+          </p:cNvPr>
+          <p:cNvSpPr>
+            <a:spLocks noGrp="1"/>
+          </p:cNvSpPr>
+          <p:nvPr>
+            <p:ph idx="1"/>
+          </p:nvPr>
+        </p:nvSpPr>
+        <p:spPr/>
+        <p:txBody>
+          <a:bodyPr/>
+          <a:lstStyle/>
+          <a:p>
+            <a:r>
+              <a:rPr lang="en-MY" dirty="0"/>
+              <a:t>Small datasets MAP@10: </a:t>
+            </a:r>
+          </a:p>
+          <a:p>
+            <a:r>
+              <a:rPr lang="en-MY" dirty="0"/>
+              <a:t>Whole datasets MAP@10: </a:t>
+            </a:r>
+          </a:p>
+        </p:txBody>
+      </p:sp>
+    </p:spTree>
+    <p:extLst>
+      <p:ext uri="{BB962C8B-B14F-4D97-AF65-F5344CB8AC3E}">
+        <p14:creationId xmlns:p14="http://schemas.microsoft.com/office/powerpoint/2010/main" val="2098917212"/>
+      </p:ext>
+    </p:extLst>
+  </p:cSld>
+  <p:clrMapOvr>
+    <a:masterClrMapping/>
+  </p:clrMapOvr>
+</p:sld>
+</file>
+
+<file path=ppt/slides/slide19.xml><?xml version="1.0" encoding="utf-8"?>
+<p:sld xmlns:a="http://schemas.openxmlformats.org/drawingml/2006/main" xmlns:r="http://schemas.openxmlformats.org/officeDocument/2006/relationships" xmlns:p="http://schemas.openxmlformats.org/presentationml/2006/main">
+  <p:cSld>
+    <p:spTree>
+      <p:nvGrpSpPr>
+        <p:cNvPr id="1" name=""/>
+        <p:cNvGrpSpPr/>
+        <p:nvPr/>
+      </p:nvGrpSpPr>
+      <p:grpSpPr>
+        <a:xfrm>
+          <a:off x="0" y="0"/>
+          <a:ext cx="0" cy="0"/>
+          <a:chOff x="0" y="0"/>
+          <a:chExt cx="0" cy="0"/>
+        </a:xfrm>
+      </p:grpSpPr>
+      <p:sp>
+        <p:nvSpPr>
+          <p:cNvPr id="2" name="Title 1">
+            <a:extLst>
+              <a:ext uri="{FF2B5EF4-FFF2-40B4-BE49-F238E27FC236}">
+                <a16:creationId xmlns:a16="http://schemas.microsoft.com/office/drawing/2014/main" id="{EF8EB9E3-ADAA-4D6C-9F1D-BE1D244915C5}"/>
+              </a:ext>
+            </a:extLst>
+          </p:cNvPr>
+          <p:cNvSpPr>
+            <a:spLocks noGrp="1"/>
+          </p:cNvSpPr>
+          <p:nvPr>
+            <p:ph type="title"/>
+          </p:nvPr>
+        </p:nvSpPr>
+        <p:spPr/>
+        <p:txBody>
+          <a:bodyPr/>
+          <a:lstStyle/>
+          <a:p>
+            <a:r>
+              <a:rPr lang="en-MY" dirty="0"/>
+              <a:t>Contributions</a:t>
+            </a:r>
+          </a:p>
+        </p:txBody>
+      </p:sp>
+      <p:sp>
+        <p:nvSpPr>
+          <p:cNvPr id="3" name="Content Placeholder 2">
+            <a:extLst>
+              <a:ext uri="{FF2B5EF4-FFF2-40B4-BE49-F238E27FC236}">
+                <a16:creationId xmlns:a16="http://schemas.microsoft.com/office/drawing/2014/main" id="{C5518FFE-CD7C-49A5-B5C6-324FC9F30D6A}"/>
+              </a:ext>
+            </a:extLst>
+          </p:cNvPr>
+          <p:cNvSpPr>
+            <a:spLocks noGrp="1"/>
+          </p:cNvSpPr>
+          <p:nvPr>
+            <p:ph idx="1"/>
+          </p:nvPr>
+        </p:nvSpPr>
+        <p:spPr/>
+        <p:txBody>
+          <a:bodyPr>
+            <a:normAutofit fontScale="92500" lnSpcReduction="20000"/>
+          </a:bodyPr>
+          <a:lstStyle/>
+          <a:p>
+            <a:r>
+              <a:rPr lang="en-MY" sz="2000" dirty="0"/>
+              <a:t>KAR CHUN TEONG</a:t>
+            </a:r>
+          </a:p>
+          <a:p>
+            <a:pPr lvl="1"/>
+            <a:r>
+              <a:rPr lang="en-MY" altLang="zh-CN" sz="2000" dirty="0"/>
+              <a:t>Production management(organization and distribution of workload, arrangement of meeting schedule, etc.)</a:t>
+            </a:r>
+          </a:p>
+          <a:p>
+            <a:pPr lvl="1"/>
+            <a:r>
+              <a:rPr lang="en-MY" sz="2000" dirty="0"/>
+              <a:t>Research and implementation of </a:t>
+            </a:r>
+            <a:r>
+              <a:rPr lang="en-MY" sz="2000" dirty="0" err="1"/>
+              <a:t>DMRNets</a:t>
+            </a:r>
+            <a:r>
+              <a:rPr lang="en-MY" sz="2000" dirty="0"/>
+              <a:t>(FCN) model</a:t>
+            </a:r>
+          </a:p>
+          <a:p>
+            <a:pPr lvl="1"/>
+            <a:r>
+              <a:rPr lang="en-MY" sz="2000" dirty="0"/>
+              <a:t>Design, creation, and compilation of final report and PPT</a:t>
+            </a:r>
+          </a:p>
+          <a:p>
+            <a:r>
+              <a:rPr lang="en-MY" altLang="zh-CN" sz="2000" dirty="0"/>
+              <a:t>MATSUNAGA TAKEHIRO</a:t>
+            </a:r>
+          </a:p>
+          <a:p>
+            <a:pPr lvl="1"/>
+            <a:r>
+              <a:rPr lang="en-MY" altLang="zh-CN" sz="2000" dirty="0"/>
+              <a:t>Implementation of LSTM model</a:t>
+            </a:r>
+          </a:p>
+          <a:p>
+            <a:pPr lvl="1"/>
+            <a:r>
+              <a:rPr lang="en-MY" altLang="zh-CN" sz="2000" dirty="0"/>
+              <a:t>Training and testing of LSTM model</a:t>
+            </a:r>
+          </a:p>
+          <a:p>
+            <a:r>
+              <a:rPr lang="en-MY" altLang="zh-CN" sz="2000" dirty="0"/>
+              <a:t>EDUARDO</a:t>
+            </a:r>
+            <a:r>
+              <a:rPr lang="zh-CN" altLang="en-US" sz="2000" dirty="0"/>
+              <a:t> </a:t>
+            </a:r>
+            <a:r>
+              <a:rPr lang="en-MY" altLang="zh-CN" sz="2000" dirty="0"/>
+              <a:t>WANG</a:t>
+            </a:r>
+            <a:r>
+              <a:rPr lang="zh-CN" altLang="en-US" sz="2000" dirty="0"/>
+              <a:t> </a:t>
+            </a:r>
+            <a:r>
+              <a:rPr lang="en-MY" altLang="zh-CN" sz="2000" dirty="0"/>
+              <a:t>ZHENG</a:t>
+            </a:r>
+          </a:p>
+          <a:p>
+            <a:pPr lvl="1"/>
+            <a:r>
+              <a:rPr lang="en-MY" altLang="zh-CN" sz="1800" dirty="0"/>
+              <a:t>Implementation of </a:t>
+            </a:r>
+            <a:r>
+              <a:rPr lang="en-MY" altLang="zh-CN" sz="1800" dirty="0" err="1"/>
+              <a:t>DMRNets</a:t>
+            </a:r>
+            <a:r>
+              <a:rPr lang="en-MY" sz="1800" dirty="0"/>
+              <a:t>(FCN)</a:t>
+            </a:r>
+            <a:r>
+              <a:rPr lang="en-MY" altLang="zh-CN" sz="1800" dirty="0"/>
+              <a:t> model</a:t>
+            </a:r>
+          </a:p>
+          <a:p>
+            <a:pPr lvl="1"/>
+            <a:r>
+              <a:rPr lang="en-MY" altLang="zh-CN" sz="1800" dirty="0"/>
+              <a:t>Training and testing of </a:t>
+            </a:r>
+            <a:r>
+              <a:rPr lang="en-MY" altLang="zh-CN" sz="1800" dirty="0" err="1"/>
+              <a:t>DMRNets</a:t>
+            </a:r>
+            <a:r>
+              <a:rPr lang="en-MY" sz="1800" dirty="0"/>
+              <a:t>(FCN)</a:t>
+            </a:r>
+            <a:r>
+              <a:rPr lang="en-MY" altLang="zh-CN" sz="1800" dirty="0"/>
+              <a:t> model</a:t>
+            </a:r>
+          </a:p>
+          <a:p>
+            <a:pPr lvl="1"/>
+            <a:endParaRPr lang="en-MY" dirty="0"/>
+          </a:p>
+        </p:txBody>
+      </p:sp>
+    </p:spTree>
+    <p:extLst>
+      <p:ext uri="{BB962C8B-B14F-4D97-AF65-F5344CB8AC3E}">
+        <p14:creationId xmlns:p14="http://schemas.microsoft.com/office/powerpoint/2010/main" val="634147495"/>
       </p:ext>
     </p:extLst>
   </p:cSld>
@@ -6368,6 +7383,93 @@
 </p:sld>
 </file>
 
+<file path=ppt/slides/slide20.xml><?xml version="1.0" encoding="utf-8"?>
+<p:sld xmlns:a="http://schemas.openxmlformats.org/drawingml/2006/main" xmlns:r="http://schemas.openxmlformats.org/officeDocument/2006/relationships" xmlns:p="http://schemas.openxmlformats.org/presentationml/2006/main">
+  <p:cSld>
+    <p:spTree>
+      <p:nvGrpSpPr>
+        <p:cNvPr id="1" name=""/>
+        <p:cNvGrpSpPr/>
+        <p:nvPr/>
+      </p:nvGrpSpPr>
+      <p:grpSpPr>
+        <a:xfrm>
+          <a:off x="0" y="0"/>
+          <a:ext cx="0" cy="0"/>
+          <a:chOff x="0" y="0"/>
+          <a:chExt cx="0" cy="0"/>
+        </a:xfrm>
+      </p:grpSpPr>
+      <p:sp>
+        <p:nvSpPr>
+          <p:cNvPr id="2" name="Title 1">
+            <a:extLst>
+              <a:ext uri="{FF2B5EF4-FFF2-40B4-BE49-F238E27FC236}">
+                <a16:creationId xmlns:a16="http://schemas.microsoft.com/office/drawing/2014/main" id="{13EBCDCC-AC0E-4224-98FD-2780A74AE843}"/>
+              </a:ext>
+            </a:extLst>
+          </p:cNvPr>
+          <p:cNvSpPr>
+            <a:spLocks noGrp="1"/>
+          </p:cNvSpPr>
+          <p:nvPr>
+            <p:ph type="ctrTitle"/>
+          </p:nvPr>
+        </p:nvSpPr>
+        <p:spPr/>
+        <p:txBody>
+          <a:bodyPr/>
+          <a:lstStyle/>
+          <a:p>
+            <a:r>
+              <a:rPr lang="en-MY" altLang="zh-CN" dirty="0"/>
+              <a:t>Thank you for listening!</a:t>
+            </a:r>
+            <a:endParaRPr lang="en-MY" dirty="0"/>
+          </a:p>
+        </p:txBody>
+      </p:sp>
+      <p:sp>
+        <p:nvSpPr>
+          <p:cNvPr id="3" name="Subtitle 2">
+            <a:extLst>
+              <a:ext uri="{FF2B5EF4-FFF2-40B4-BE49-F238E27FC236}">
+                <a16:creationId xmlns:a16="http://schemas.microsoft.com/office/drawing/2014/main" id="{C8ACB5B7-FC3C-43ED-BB53-3FBA32F7AAAA}"/>
+              </a:ext>
+            </a:extLst>
+          </p:cNvPr>
+          <p:cNvSpPr>
+            <a:spLocks noGrp="1"/>
+          </p:cNvSpPr>
+          <p:nvPr>
+            <p:ph type="subTitle" idx="1"/>
+          </p:nvPr>
+        </p:nvSpPr>
+        <p:spPr/>
+        <p:txBody>
+          <a:bodyPr/>
+          <a:lstStyle/>
+          <a:p>
+            <a:r>
+              <a:rPr lang="en-MY" sz="1600" dirty="0"/>
+              <a:t>This presentation is made, designed and brought to you by KAR CHUN TEONG. </a:t>
+            </a:r>
+          </a:p>
+        </p:txBody>
+      </p:sp>
+    </p:spTree>
+    <p:extLst>
+      <p:ext uri="{BB962C8B-B14F-4D97-AF65-F5344CB8AC3E}">
+        <p14:creationId xmlns:p14="http://schemas.microsoft.com/office/powerpoint/2010/main" val="1089557770"/>
+      </p:ext>
+    </p:extLst>
+  </p:cSld>
+  <p:clrMapOvr>
+    <a:masterClrMapping/>
+  </p:clrMapOvr>
+</p:sld>
+</file>
+
 <file path=ppt/slides/slide3.xml><?xml version="1.0" encoding="utf-8"?>
 <p:sld xmlns:a="http://schemas.openxmlformats.org/drawingml/2006/main" xmlns:r="http://schemas.openxmlformats.org/officeDocument/2006/relationships" xmlns:p="http://schemas.openxmlformats.org/presentationml/2006/main">
   <p:cSld>
@@ -6433,7 +7535,7 @@
         <p:spPr/>
         <p:txBody>
           <a:bodyPr>
-            <a:normAutofit fontScale="85000" lnSpcReduction="20000"/>
+            <a:normAutofit fontScale="47500" lnSpcReduction="20000"/>
           </a:bodyPr>
           <a:lstStyle/>
           <a:p>
@@ -6447,6 +7549,12 @@
             <a:r>
               <a:rPr lang="en-MY" sz="3200" dirty="0"/>
               <a:t>*Analysed by KAR CHUN TEONG</a:t>
+            </a:r>
+          </a:p>
+          <a:p>
+            <a:r>
+              <a:rPr lang="en-MY" sz="3200" dirty="0"/>
+              <a:t>Implemented by KAR CHUN TEONG and EDUARDO WANG ZHENG</a:t>
             </a:r>
           </a:p>
         </p:txBody>

</xml_diff>

<commit_message>
update report and ppt
add experiments and graph and analysis
</commit_message>
<xml_diff>
--- a/518030990014.pptx
+++ b/518030990014.pptx
@@ -23,8 +23,14 @@
     <p:sldId id="287" r:id="rId17"/>
     <p:sldId id="290" r:id="rId18"/>
     <p:sldId id="291" r:id="rId19"/>
-    <p:sldId id="274" r:id="rId20"/>
-    <p:sldId id="280" r:id="rId21"/>
+    <p:sldId id="293" r:id="rId20"/>
+    <p:sldId id="292" r:id="rId21"/>
+    <p:sldId id="294" r:id="rId22"/>
+    <p:sldId id="295" r:id="rId23"/>
+    <p:sldId id="296" r:id="rId24"/>
+    <p:sldId id="274" r:id="rId25"/>
+    <p:sldId id="297" r:id="rId26"/>
+    <p:sldId id="280" r:id="rId27"/>
   </p:sldIdLst>
   <p:sldSz cx="12192000" cy="6858000"/>
   <p:notesSz cx="6858000" cy="9144000"/>
@@ -853,7 +859,7 @@
           <a:p>
             <a:fld id="{250C7B50-B695-44F0-9EFD-5C83BA7AF2F4}" type="datetimeFigureOut">
               <a:rPr lang="en-MY" smtClean="0"/>
-              <a:t>21/12/2020</a:t>
+              <a:t>22/12/2020</a:t>
             </a:fld>
             <a:endParaRPr lang="en-MY"/>
           </a:p>
@@ -1104,7 +1110,7 @@
           <a:p>
             <a:fld id="{250C7B50-B695-44F0-9EFD-5C83BA7AF2F4}" type="datetimeFigureOut">
               <a:rPr lang="en-MY" smtClean="0"/>
-              <a:t>21/12/2020</a:t>
+              <a:t>22/12/2020</a:t>
             </a:fld>
             <a:endParaRPr lang="en-MY"/>
           </a:p>
@@ -1418,7 +1424,7 @@
           <a:p>
             <a:fld id="{250C7B50-B695-44F0-9EFD-5C83BA7AF2F4}" type="datetimeFigureOut">
               <a:rPr lang="en-MY" smtClean="0"/>
-              <a:t>21/12/2020</a:t>
+              <a:t>22/12/2020</a:t>
             </a:fld>
             <a:endParaRPr lang="en-MY"/>
           </a:p>
@@ -1759,7 +1765,7 @@
           <a:p>
             <a:fld id="{250C7B50-B695-44F0-9EFD-5C83BA7AF2F4}" type="datetimeFigureOut">
               <a:rPr lang="en-MY" smtClean="0"/>
-              <a:t>21/12/2020</a:t>
+              <a:t>22/12/2020</a:t>
             </a:fld>
             <a:endParaRPr lang="en-MY"/>
           </a:p>
@@ -2073,7 +2079,7 @@
           <a:p>
             <a:fld id="{250C7B50-B695-44F0-9EFD-5C83BA7AF2F4}" type="datetimeFigureOut">
               <a:rPr lang="en-MY" smtClean="0"/>
-              <a:t>21/12/2020</a:t>
+              <a:t>22/12/2020</a:t>
             </a:fld>
             <a:endParaRPr lang="en-MY"/>
           </a:p>
@@ -2466,7 +2472,7 @@
           <a:p>
             <a:fld id="{250C7B50-B695-44F0-9EFD-5C83BA7AF2F4}" type="datetimeFigureOut">
               <a:rPr lang="en-MY" smtClean="0"/>
-              <a:t>21/12/2020</a:t>
+              <a:t>22/12/2020</a:t>
             </a:fld>
             <a:endParaRPr lang="en-MY"/>
           </a:p>
@@ -2636,7 +2642,7 @@
           <a:p>
             <a:fld id="{250C7B50-B695-44F0-9EFD-5C83BA7AF2F4}" type="datetimeFigureOut">
               <a:rPr lang="en-MY" smtClean="0"/>
-              <a:t>21/12/2020</a:t>
+              <a:t>22/12/2020</a:t>
             </a:fld>
             <a:endParaRPr lang="en-MY"/>
           </a:p>
@@ -2816,7 +2822,7 @@
           <a:p>
             <a:fld id="{250C7B50-B695-44F0-9EFD-5C83BA7AF2F4}" type="datetimeFigureOut">
               <a:rPr lang="en-MY" smtClean="0"/>
-              <a:t>21/12/2020</a:t>
+              <a:t>22/12/2020</a:t>
             </a:fld>
             <a:endParaRPr lang="en-MY"/>
           </a:p>
@@ -2992,7 +2998,7 @@
           <a:p>
             <a:fld id="{250C7B50-B695-44F0-9EFD-5C83BA7AF2F4}" type="datetimeFigureOut">
               <a:rPr lang="en-MY" smtClean="0"/>
-              <a:t>21/12/2020</a:t>
+              <a:t>22/12/2020</a:t>
             </a:fld>
             <a:endParaRPr lang="en-MY"/>
           </a:p>
@@ -3239,7 +3245,7 @@
           <a:p>
             <a:fld id="{250C7B50-B695-44F0-9EFD-5C83BA7AF2F4}" type="datetimeFigureOut">
               <a:rPr lang="en-MY" smtClean="0"/>
-              <a:t>21/12/2020</a:t>
+              <a:t>22/12/2020</a:t>
             </a:fld>
             <a:endParaRPr lang="en-MY"/>
           </a:p>
@@ -3471,7 +3477,7 @@
           <a:p>
             <a:fld id="{250C7B50-B695-44F0-9EFD-5C83BA7AF2F4}" type="datetimeFigureOut">
               <a:rPr lang="en-MY" smtClean="0"/>
-              <a:t>21/12/2020</a:t>
+              <a:t>22/12/2020</a:t>
             </a:fld>
             <a:endParaRPr lang="en-MY"/>
           </a:p>
@@ -3845,7 +3851,7 @@
           <a:p>
             <a:fld id="{250C7B50-B695-44F0-9EFD-5C83BA7AF2F4}" type="datetimeFigureOut">
               <a:rPr lang="en-MY" smtClean="0"/>
-              <a:t>21/12/2020</a:t>
+              <a:t>22/12/2020</a:t>
             </a:fld>
             <a:endParaRPr lang="en-MY"/>
           </a:p>
@@ -3968,7 +3974,7 @@
           <a:p>
             <a:fld id="{250C7B50-B695-44F0-9EFD-5C83BA7AF2F4}" type="datetimeFigureOut">
               <a:rPr lang="en-MY" smtClean="0"/>
-              <a:t>21/12/2020</a:t>
+              <a:t>22/12/2020</a:t>
             </a:fld>
             <a:endParaRPr lang="en-MY"/>
           </a:p>
@@ -4063,7 +4069,7 @@
           <a:p>
             <a:fld id="{250C7B50-B695-44F0-9EFD-5C83BA7AF2F4}" type="datetimeFigureOut">
               <a:rPr lang="en-MY" smtClean="0"/>
-              <a:t>21/12/2020</a:t>
+              <a:t>22/12/2020</a:t>
             </a:fld>
             <a:endParaRPr lang="en-MY"/>
           </a:p>
@@ -4318,7 +4324,7 @@
           <a:p>
             <a:fld id="{250C7B50-B695-44F0-9EFD-5C83BA7AF2F4}" type="datetimeFigureOut">
               <a:rPr lang="en-MY" smtClean="0"/>
-              <a:t>21/12/2020</a:t>
+              <a:t>22/12/2020</a:t>
             </a:fld>
             <a:endParaRPr lang="en-MY"/>
           </a:p>
@@ -4581,7 +4587,7 @@
           <a:p>
             <a:fld id="{250C7B50-B695-44F0-9EFD-5C83BA7AF2F4}" type="datetimeFigureOut">
               <a:rPr lang="en-MY" smtClean="0"/>
-              <a:t>21/12/2020</a:t>
+              <a:t>22/12/2020</a:t>
             </a:fld>
             <a:endParaRPr lang="en-MY"/>
           </a:p>
@@ -5324,7 +5330,7 @@
           <a:p>
             <a:fld id="{250C7B50-B695-44F0-9EFD-5C83BA7AF2F4}" type="datetimeFigureOut">
               <a:rPr lang="en-MY" smtClean="0"/>
-              <a:t>21/12/2020</a:t>
+              <a:t>22/12/2020</a:t>
             </a:fld>
             <a:endParaRPr lang="en-MY"/>
           </a:p>
@@ -6013,7 +6019,13 @@
           <a:p>
             <a:r>
               <a:rPr lang="en-MY" dirty="0"/>
-              <a:t>Small datasets MAP@10: </a:t>
+              <a:t>First 200 training shards MAP@10: </a:t>
+            </a:r>
+          </a:p>
+          <a:p>
+            <a:r>
+              <a:rPr lang="en-MY" dirty="0"/>
+              <a:t>First 100 validation shards MAP@10:</a:t>
             </a:r>
           </a:p>
           <a:p>
@@ -6539,13 +6551,19 @@
           <a:p>
             <a:r>
               <a:rPr lang="en-MY" dirty="0"/>
-              <a:t>Small datasets MAP@10: </a:t>
+              <a:t>First 200 training shards MAP@10: </a:t>
             </a:r>
           </a:p>
           <a:p>
             <a:r>
               <a:rPr lang="en-MY" dirty="0"/>
-              <a:t>Whole datasets MAP@10: 0.76 </a:t>
+              <a:t>First 100 validation shards MAP@10:</a:t>
+            </a:r>
+          </a:p>
+          <a:p>
+            <a:r>
+              <a:rPr lang="en-MY" dirty="0"/>
+              <a:t>Whole datasets MAP@10: 0.759 </a:t>
             </a:r>
           </a:p>
         </p:txBody>
@@ -7000,7 +7018,13 @@
           <a:p>
             <a:r>
               <a:rPr lang="en-MY" dirty="0"/>
-              <a:t>Small datasets MAP@10: 0.89</a:t>
+              <a:t>First 200 training shards MAP@10: </a:t>
+            </a:r>
+          </a:p>
+          <a:p>
+            <a:r>
+              <a:rPr lang="en-MY" dirty="0"/>
+              <a:t>First 100 validation shards MAP@10:</a:t>
             </a:r>
           </a:p>
           <a:p>
@@ -7009,8 +7033,8 @@
               <a:t>Whole datasets MAP@10: </a:t>
             </a:r>
             <a:r>
-              <a:rPr lang="en-US" altLang="zh-CN"/>
-              <a:t>0.76</a:t>
+              <a:rPr lang="en-US" altLang="zh-CN" dirty="0"/>
+              <a:t>0.763</a:t>
             </a:r>
             <a:endParaRPr lang="en-MY" dirty="0"/>
           </a:p>
@@ -7051,7 +7075,7 @@
           <p:cNvPr id="2" name="Title 1">
             <a:extLst>
               <a:ext uri="{FF2B5EF4-FFF2-40B4-BE49-F238E27FC236}">
-                <a16:creationId xmlns:a16="http://schemas.microsoft.com/office/drawing/2014/main" id="{EF8EB9E3-ADAA-4D6C-9F1D-BE1D244915C5}"/>
+                <a16:creationId xmlns:a16="http://schemas.microsoft.com/office/drawing/2014/main" id="{13EBCDCC-AC0E-4224-98FD-2780A74AE843}"/>
               </a:ext>
             </a:extLst>
           </p:cNvPr>
@@ -7059,7 +7083,7 @@
             <a:spLocks noGrp="1"/>
           </p:cNvSpPr>
           <p:nvPr>
-            <p:ph type="title"/>
+            <p:ph type="ctrTitle"/>
           </p:nvPr>
         </p:nvSpPr>
         <p:spPr/>
@@ -7068,18 +7092,18 @@
           <a:lstStyle/>
           <a:p>
             <a:r>
-              <a:rPr lang="en-MY" dirty="0"/>
-              <a:t>Contributions</a:t>
-            </a:r>
-          </a:p>
-        </p:txBody>
-      </p:sp>
-      <p:sp>
-        <p:nvSpPr>
-          <p:cNvPr id="3" name="Content Placeholder 2">
+              <a:rPr lang="en-MY" sz="4800" dirty="0"/>
+              <a:t>Experiments and Analysis</a:t>
+            </a:r>
+          </a:p>
+        </p:txBody>
+      </p:sp>
+      <p:sp>
+        <p:nvSpPr>
+          <p:cNvPr id="3" name="Subtitle 2">
             <a:extLst>
               <a:ext uri="{FF2B5EF4-FFF2-40B4-BE49-F238E27FC236}">
-                <a16:creationId xmlns:a16="http://schemas.microsoft.com/office/drawing/2014/main" id="{C5518FFE-CD7C-49A5-B5C6-324FC9F30D6A}"/>
+                <a16:creationId xmlns:a16="http://schemas.microsoft.com/office/drawing/2014/main" id="{C8ACB5B7-FC3C-43ED-BB53-3FBA32F7AAAA}"/>
               </a:ext>
             </a:extLst>
           </p:cNvPr>
@@ -7087,140 +7111,27 @@
             <a:spLocks noGrp="1"/>
           </p:cNvSpPr>
           <p:nvPr>
-            <p:ph idx="1"/>
+            <p:ph type="subTitle" idx="1"/>
           </p:nvPr>
         </p:nvSpPr>
         <p:spPr/>
         <p:txBody>
           <a:bodyPr>
-            <a:normAutofit fontScale="92500" lnSpcReduction="20000"/>
+            <a:normAutofit/>
           </a:bodyPr>
           <a:lstStyle/>
           <a:p>
             <a:r>
-              <a:rPr lang="en-MY" sz="2000" dirty="0"/>
-              <a:t>KAR CHUN TEONG</a:t>
-            </a:r>
-          </a:p>
-          <a:p>
-            <a:pPr lvl="1"/>
-            <a:r>
-              <a:rPr lang="en-MY" altLang="zh-CN" sz="2000" dirty="0"/>
-              <a:t>Production management(organization and distribution of workload, arrangement of meeting schedule, etc.)</a:t>
-            </a:r>
-          </a:p>
-          <a:p>
-            <a:pPr lvl="1"/>
-            <a:r>
-              <a:rPr lang="en-MY" sz="2000" dirty="0"/>
-              <a:t>Research and implementation of </a:t>
-            </a:r>
-            <a:r>
-              <a:rPr lang="en-MY" sz="2000" dirty="0" err="1"/>
-              <a:t>DMRNets</a:t>
-            </a:r>
-            <a:r>
-              <a:rPr lang="en-MY" sz="2000" dirty="0"/>
-              <a:t>(FCN) model</a:t>
-            </a:r>
-          </a:p>
-          <a:p>
-            <a:pPr lvl="1"/>
-            <a:r>
-              <a:rPr lang="en-MY" sz="2000" dirty="0"/>
-              <a:t>Design, creation, and compilation of final report and PPT</a:t>
-            </a:r>
-          </a:p>
-          <a:p>
-            <a:r>
-              <a:rPr lang="en-MY" altLang="zh-CN" sz="2000" dirty="0"/>
-              <a:t>MATSUNAGA TAKEHIRO</a:t>
-            </a:r>
-          </a:p>
-          <a:p>
-            <a:pPr lvl="1"/>
-            <a:r>
-              <a:rPr lang="en-MY" altLang="zh-CN" sz="2000" dirty="0"/>
-              <a:t>Implementation of LSTM model</a:t>
-            </a:r>
-          </a:p>
-          <a:p>
-            <a:pPr lvl="1"/>
-            <a:r>
-              <a:rPr lang="en-MY" altLang="zh-CN" sz="2000" dirty="0"/>
-              <a:t>Training and testing of LSTM model</a:t>
-            </a:r>
-          </a:p>
-          <a:p>
-            <a:r>
-              <a:rPr lang="en-MY" altLang="zh-CN" sz="2000" dirty="0"/>
-              <a:t>EDUARDO</a:t>
-            </a:r>
-            <a:r>
-              <a:rPr lang="zh-CN" altLang="en-US" sz="2000" dirty="0"/>
-              <a:t> </a:t>
-            </a:r>
-            <a:r>
-              <a:rPr lang="en-MY" altLang="zh-CN" sz="2000" dirty="0"/>
-              <a:t>WANG</a:t>
-            </a:r>
-            <a:r>
-              <a:rPr lang="zh-CN" altLang="en-US" sz="2000" dirty="0"/>
-              <a:t> </a:t>
-            </a:r>
-            <a:r>
-              <a:rPr lang="en-MY" altLang="zh-CN" sz="2000" dirty="0"/>
-              <a:t>ZHENG</a:t>
-            </a:r>
-          </a:p>
-          <a:p>
-            <a:pPr lvl="1"/>
-            <a:r>
-              <a:rPr lang="en-MY" altLang="zh-CN" sz="1800" dirty="0"/>
-              <a:t>Implementation of </a:t>
-            </a:r>
-            <a:r>
-              <a:rPr lang="en-MY" altLang="zh-CN" sz="1800" dirty="0" err="1"/>
-              <a:t>DMRNets</a:t>
-            </a:r>
-            <a:r>
-              <a:rPr lang="en-MY" sz="1800" dirty="0"/>
-              <a:t>(FCN)</a:t>
-            </a:r>
-            <a:r>
-              <a:rPr lang="en-MY" altLang="zh-CN" sz="1800" dirty="0"/>
-              <a:t> model</a:t>
-            </a:r>
-          </a:p>
-          <a:p>
-            <a:pPr lvl="1"/>
-            <a:r>
-              <a:rPr lang="en-MY" altLang="zh-CN" sz="1800" dirty="0"/>
-              <a:t>Training and testing of </a:t>
-            </a:r>
-            <a:r>
-              <a:rPr lang="en-MY" altLang="zh-CN" sz="1800" dirty="0" err="1"/>
-              <a:t>DMRNets</a:t>
-            </a:r>
-            <a:r>
-              <a:rPr lang="en-MY" sz="1800" dirty="0"/>
-              <a:t>(FCN)</a:t>
-            </a:r>
-            <a:r>
-              <a:rPr lang="en-MY" altLang="zh-CN" sz="1800" dirty="0"/>
-              <a:t> model</a:t>
-            </a:r>
-          </a:p>
-          <a:p>
-            <a:pPr lvl="1"/>
-            <a:endParaRPr lang="en-MY" dirty="0"/>
+              <a:rPr lang="en-MY" sz="3200" dirty="0"/>
+              <a:t>Tested by TAKEHIRO MATSUNAGA and Analysed by KAR CHUN TEONG</a:t>
+            </a:r>
           </a:p>
         </p:txBody>
       </p:sp>
     </p:spTree>
     <p:extLst>
       <p:ext uri="{BB962C8B-B14F-4D97-AF65-F5344CB8AC3E}">
-        <p14:creationId xmlns:p14="http://schemas.microsoft.com/office/powerpoint/2010/main" val="634147495"/>
+        <p14:creationId xmlns:p14="http://schemas.microsoft.com/office/powerpoint/2010/main" val="1335052827"/>
       </p:ext>
     </p:extLst>
   </p:cSld>
@@ -7410,6 +7321,672 @@
           <p:cNvPr id="2" name="Title 1">
             <a:extLst>
               <a:ext uri="{FF2B5EF4-FFF2-40B4-BE49-F238E27FC236}">
+                <a16:creationId xmlns:a16="http://schemas.microsoft.com/office/drawing/2014/main" id="{236C9839-F5A9-4FCE-97E4-54920CAA162D}"/>
+              </a:ext>
+            </a:extLst>
+          </p:cNvPr>
+          <p:cNvSpPr>
+            <a:spLocks noGrp="1"/>
+          </p:cNvSpPr>
+          <p:nvPr>
+            <p:ph type="title"/>
+          </p:nvPr>
+        </p:nvSpPr>
+        <p:spPr/>
+        <p:txBody>
+          <a:bodyPr/>
+          <a:lstStyle/>
+          <a:p>
+            <a:r>
+              <a:rPr lang="en-MY" dirty="0"/>
+              <a:t>Training</a:t>
+            </a:r>
+          </a:p>
+        </p:txBody>
+      </p:sp>
+      <p:sp>
+        <p:nvSpPr>
+          <p:cNvPr id="3" name="Content Placeholder 2">
+            <a:extLst>
+              <a:ext uri="{FF2B5EF4-FFF2-40B4-BE49-F238E27FC236}">
+                <a16:creationId xmlns:a16="http://schemas.microsoft.com/office/drawing/2014/main" id="{B889FCD1-A234-4AD8-9B54-6FE8E1ABDAFE}"/>
+              </a:ext>
+            </a:extLst>
+          </p:cNvPr>
+          <p:cNvSpPr>
+            <a:spLocks noGrp="1"/>
+          </p:cNvSpPr>
+          <p:nvPr>
+            <p:ph idx="1"/>
+          </p:nvPr>
+        </p:nvSpPr>
+        <p:spPr/>
+        <p:txBody>
+          <a:bodyPr/>
+          <a:lstStyle/>
+          <a:p>
+            <a:r>
+              <a:rPr lang="en-MY" dirty="0"/>
+              <a:t>Cloud platforms: expensive (GCP offers free trial but needs credit card)</a:t>
+            </a:r>
+          </a:p>
+          <a:p>
+            <a:r>
+              <a:rPr lang="en-MY" dirty="0"/>
+              <a:t>At the end, use our own computers: can only train with small subsets (</a:t>
+            </a:r>
+            <a:r>
+              <a:rPr lang="en-US" dirty="0">
+                <a:effectLst/>
+              </a:rPr>
+              <a:t>first 200 training shards and the first 100 validation shards.)</a:t>
+            </a:r>
+          </a:p>
+          <a:p>
+            <a:endParaRPr lang="en-MY" dirty="0"/>
+          </a:p>
+        </p:txBody>
+      </p:sp>
+    </p:spTree>
+    <p:extLst>
+      <p:ext uri="{BB962C8B-B14F-4D97-AF65-F5344CB8AC3E}">
+        <p14:creationId xmlns:p14="http://schemas.microsoft.com/office/powerpoint/2010/main" val="390895238"/>
+      </p:ext>
+    </p:extLst>
+  </p:cSld>
+  <p:clrMapOvr>
+    <a:masterClrMapping/>
+  </p:clrMapOvr>
+</p:sld>
+</file>
+
+<file path=ppt/slides/slide21.xml><?xml version="1.0" encoding="utf-8"?>
+<p:sld xmlns:a="http://schemas.openxmlformats.org/drawingml/2006/main" xmlns:r="http://schemas.openxmlformats.org/officeDocument/2006/relationships" xmlns:p="http://schemas.openxmlformats.org/presentationml/2006/main">
+  <p:cSld>
+    <p:spTree>
+      <p:nvGrpSpPr>
+        <p:cNvPr id="1" name=""/>
+        <p:cNvGrpSpPr/>
+        <p:nvPr/>
+      </p:nvGrpSpPr>
+      <p:grpSpPr>
+        <a:xfrm>
+          <a:off x="0" y="0"/>
+          <a:ext cx="0" cy="0"/>
+          <a:chOff x="0" y="0"/>
+          <a:chExt cx="0" cy="0"/>
+        </a:xfrm>
+      </p:grpSpPr>
+      <p:sp>
+        <p:nvSpPr>
+          <p:cNvPr id="2" name="Title 1">
+            <a:extLst>
+              <a:ext uri="{FF2B5EF4-FFF2-40B4-BE49-F238E27FC236}">
+                <a16:creationId xmlns:a16="http://schemas.microsoft.com/office/drawing/2014/main" id="{704F2CB1-42E9-49EC-A302-3BE0AC27F0AF}"/>
+              </a:ext>
+            </a:extLst>
+          </p:cNvPr>
+          <p:cNvSpPr>
+            <a:spLocks noGrp="1"/>
+          </p:cNvSpPr>
+          <p:nvPr>
+            <p:ph type="title"/>
+          </p:nvPr>
+        </p:nvSpPr>
+        <p:spPr/>
+        <p:txBody>
+          <a:bodyPr/>
+          <a:lstStyle/>
+          <a:p>
+            <a:r>
+              <a:rPr lang="en-MY" dirty="0"/>
+              <a:t>LSTM training curve</a:t>
+            </a:r>
+          </a:p>
+        </p:txBody>
+      </p:sp>
+      <p:pic>
+        <p:nvPicPr>
+          <p:cNvPr id="5" name="Content Placeholder 4">
+            <a:extLst>
+              <a:ext uri="{FF2B5EF4-FFF2-40B4-BE49-F238E27FC236}">
+                <a16:creationId xmlns:a16="http://schemas.microsoft.com/office/drawing/2014/main" id="{8CB3B911-BB54-4446-8C81-D704760EED6F}"/>
+              </a:ext>
+            </a:extLst>
+          </p:cNvPr>
+          <p:cNvPicPr>
+            <a:picLocks noGrp="1" noChangeAspect="1"/>
+          </p:cNvPicPr>
+          <p:nvPr>
+            <p:ph idx="1"/>
+          </p:nvPr>
+        </p:nvPicPr>
+        <p:blipFill>
+          <a:blip r:embed="rId2">
+            <a:extLst>
+              <a:ext uri="{28A0092B-C50C-407E-A947-70E740481C1C}">
+                <a14:useLocalDpi xmlns:a14="http://schemas.microsoft.com/office/drawing/2010/main" val="0"/>
+              </a:ext>
+            </a:extLst>
+          </a:blip>
+          <a:stretch>
+            <a:fillRect/>
+          </a:stretch>
+        </p:blipFill>
+        <p:spPr>
+          <a:xfrm>
+            <a:off x="922790" y="1766085"/>
+            <a:ext cx="6947590" cy="4183028"/>
+          </a:xfrm>
+        </p:spPr>
+      </p:pic>
+    </p:spTree>
+    <p:extLst>
+      <p:ext uri="{BB962C8B-B14F-4D97-AF65-F5344CB8AC3E}">
+        <p14:creationId xmlns:p14="http://schemas.microsoft.com/office/powerpoint/2010/main" val="1931778933"/>
+      </p:ext>
+    </p:extLst>
+  </p:cSld>
+  <p:clrMapOvr>
+    <a:masterClrMapping/>
+  </p:clrMapOvr>
+</p:sld>
+</file>
+
+<file path=ppt/slides/slide22.xml><?xml version="1.0" encoding="utf-8"?>
+<p:sld xmlns:a="http://schemas.openxmlformats.org/drawingml/2006/main" xmlns:r="http://schemas.openxmlformats.org/officeDocument/2006/relationships" xmlns:p="http://schemas.openxmlformats.org/presentationml/2006/main">
+  <p:cSld>
+    <p:spTree>
+      <p:nvGrpSpPr>
+        <p:cNvPr id="1" name=""/>
+        <p:cNvGrpSpPr/>
+        <p:nvPr/>
+      </p:nvGrpSpPr>
+      <p:grpSpPr>
+        <a:xfrm>
+          <a:off x="0" y="0"/>
+          <a:ext cx="0" cy="0"/>
+          <a:chOff x="0" y="0"/>
+          <a:chExt cx="0" cy="0"/>
+        </a:xfrm>
+      </p:grpSpPr>
+      <p:sp>
+        <p:nvSpPr>
+          <p:cNvPr id="2" name="Title 1">
+            <a:extLst>
+              <a:ext uri="{FF2B5EF4-FFF2-40B4-BE49-F238E27FC236}">
+                <a16:creationId xmlns:a16="http://schemas.microsoft.com/office/drawing/2014/main" id="{704F2CB1-42E9-49EC-A302-3BE0AC27F0AF}"/>
+              </a:ext>
+            </a:extLst>
+          </p:cNvPr>
+          <p:cNvSpPr>
+            <a:spLocks noGrp="1"/>
+          </p:cNvSpPr>
+          <p:nvPr>
+            <p:ph type="title"/>
+          </p:nvPr>
+        </p:nvSpPr>
+        <p:spPr/>
+        <p:txBody>
+          <a:bodyPr/>
+          <a:lstStyle/>
+          <a:p>
+            <a:r>
+              <a:rPr lang="en-MY" dirty="0" err="1"/>
+              <a:t>biLSTM</a:t>
+            </a:r>
+            <a:r>
+              <a:rPr lang="en-MY" dirty="0"/>
+              <a:t> training curve</a:t>
+            </a:r>
+          </a:p>
+        </p:txBody>
+      </p:sp>
+      <p:pic>
+        <p:nvPicPr>
+          <p:cNvPr id="7" name="Content Placeholder 6">
+            <a:extLst>
+              <a:ext uri="{FF2B5EF4-FFF2-40B4-BE49-F238E27FC236}">
+                <a16:creationId xmlns:a16="http://schemas.microsoft.com/office/drawing/2014/main" id="{CB804F4D-A7F1-486D-9A06-B9E34A0962C8}"/>
+              </a:ext>
+            </a:extLst>
+          </p:cNvPr>
+          <p:cNvPicPr>
+            <a:picLocks noGrp="1" noChangeAspect="1"/>
+          </p:cNvPicPr>
+          <p:nvPr>
+            <p:ph idx="1"/>
+          </p:nvPr>
+        </p:nvPicPr>
+        <p:blipFill>
+          <a:blip r:embed="rId2">
+            <a:extLst>
+              <a:ext uri="{28A0092B-C50C-407E-A947-70E740481C1C}">
+                <a14:useLocalDpi xmlns:a14="http://schemas.microsoft.com/office/drawing/2010/main" val="0"/>
+              </a:ext>
+            </a:extLst>
+          </a:blip>
+          <a:stretch>
+            <a:fillRect/>
+          </a:stretch>
+        </p:blipFill>
+        <p:spPr>
+          <a:xfrm>
+            <a:off x="940756" y="1930400"/>
+            <a:ext cx="6877783" cy="4140998"/>
+          </a:xfrm>
+        </p:spPr>
+      </p:pic>
+    </p:spTree>
+    <p:extLst>
+      <p:ext uri="{BB962C8B-B14F-4D97-AF65-F5344CB8AC3E}">
+        <p14:creationId xmlns:p14="http://schemas.microsoft.com/office/powerpoint/2010/main" val="703183925"/>
+      </p:ext>
+    </p:extLst>
+  </p:cSld>
+  <p:clrMapOvr>
+    <a:masterClrMapping/>
+  </p:clrMapOvr>
+</p:sld>
+</file>
+
+<file path=ppt/slides/slide23.xml><?xml version="1.0" encoding="utf-8"?>
+<p:sld xmlns:a="http://schemas.openxmlformats.org/drawingml/2006/main" xmlns:r="http://schemas.openxmlformats.org/officeDocument/2006/relationships" xmlns:p="http://schemas.openxmlformats.org/presentationml/2006/main">
+  <p:cSld>
+    <p:spTree>
+      <p:nvGrpSpPr>
+        <p:cNvPr id="1" name=""/>
+        <p:cNvGrpSpPr/>
+        <p:nvPr/>
+      </p:nvGrpSpPr>
+      <p:grpSpPr>
+        <a:xfrm>
+          <a:off x="0" y="0"/>
+          <a:ext cx="0" cy="0"/>
+          <a:chOff x="0" y="0"/>
+          <a:chExt cx="0" cy="0"/>
+        </a:xfrm>
+      </p:grpSpPr>
+      <p:sp>
+        <p:nvSpPr>
+          <p:cNvPr id="2" name="Title 1">
+            <a:extLst>
+              <a:ext uri="{FF2B5EF4-FFF2-40B4-BE49-F238E27FC236}">
+                <a16:creationId xmlns:a16="http://schemas.microsoft.com/office/drawing/2014/main" id="{51B02E2B-002A-4992-A5C0-E5F7659DB2E1}"/>
+              </a:ext>
+            </a:extLst>
+          </p:cNvPr>
+          <p:cNvSpPr>
+            <a:spLocks noGrp="1"/>
+          </p:cNvSpPr>
+          <p:nvPr>
+            <p:ph type="title"/>
+          </p:nvPr>
+        </p:nvSpPr>
+        <p:spPr/>
+        <p:txBody>
+          <a:bodyPr/>
+          <a:lstStyle/>
+          <a:p>
+            <a:r>
+              <a:rPr lang="en-MY" dirty="0"/>
+              <a:t>Comparison of all models</a:t>
+            </a:r>
+          </a:p>
+        </p:txBody>
+      </p:sp>
+      <p:sp>
+        <p:nvSpPr>
+          <p:cNvPr id="3" name="Content Placeholder 2">
+            <a:extLst>
+              <a:ext uri="{FF2B5EF4-FFF2-40B4-BE49-F238E27FC236}">
+                <a16:creationId xmlns:a16="http://schemas.microsoft.com/office/drawing/2014/main" id="{4DAE0221-83F0-45C9-A8C5-2788C6FD018E}"/>
+              </a:ext>
+            </a:extLst>
+          </p:cNvPr>
+          <p:cNvSpPr>
+            <a:spLocks noGrp="1"/>
+          </p:cNvSpPr>
+          <p:nvPr>
+            <p:ph idx="1"/>
+          </p:nvPr>
+        </p:nvSpPr>
+        <p:spPr/>
+        <p:txBody>
+          <a:bodyPr>
+            <a:normAutofit lnSpcReduction="10000"/>
+          </a:bodyPr>
+          <a:lstStyle/>
+          <a:p>
+            <a:endParaRPr lang="en-MY" dirty="0"/>
+          </a:p>
+          <a:p>
+            <a:endParaRPr lang="en-MY" dirty="0"/>
+          </a:p>
+          <a:p>
+            <a:endParaRPr lang="en-MY" dirty="0"/>
+          </a:p>
+          <a:p>
+            <a:endParaRPr lang="en-MY" dirty="0"/>
+          </a:p>
+          <a:p>
+            <a:endParaRPr lang="en-MY" dirty="0"/>
+          </a:p>
+          <a:p>
+            <a:r>
+              <a:rPr lang="en-MY" dirty="0"/>
+              <a:t>MAP@10 for 200 train and 100 validation always &gt; MAP@10 for all datasets</a:t>
+            </a:r>
+          </a:p>
+          <a:p>
+            <a:pPr lvl="1"/>
+            <a:r>
+              <a:rPr lang="en-MY" dirty="0"/>
+              <a:t>We train with 200 train and 100 validation, possible overfit</a:t>
+            </a:r>
+          </a:p>
+          <a:p>
+            <a:r>
+              <a:rPr lang="en-MY" dirty="0"/>
+              <a:t>However, LSTM and </a:t>
+            </a:r>
+            <a:r>
+              <a:rPr lang="en-MY" dirty="0" err="1"/>
+              <a:t>biLSTM</a:t>
+            </a:r>
+            <a:r>
+              <a:rPr lang="en-MY" dirty="0"/>
+              <a:t> still &gt; 0.75 with only small subsets of training data</a:t>
+            </a:r>
+          </a:p>
+          <a:p>
+            <a:pPr lvl="1"/>
+            <a:r>
+              <a:rPr lang="en-MY" dirty="0"/>
+              <a:t>Hypothesis: the MAP@10 could be higher with more training data.</a:t>
+            </a:r>
+          </a:p>
+          <a:p>
+            <a:pPr lvl="1"/>
+            <a:r>
+              <a:rPr lang="en-MY" dirty="0"/>
+              <a:t>Don’t have enough computing power to prove that.</a:t>
+            </a:r>
+          </a:p>
+          <a:p>
+            <a:endParaRPr lang="en-MY" dirty="0"/>
+          </a:p>
+          <a:p>
+            <a:endParaRPr lang="en-MY" dirty="0"/>
+          </a:p>
+        </p:txBody>
+      </p:sp>
+      <p:pic>
+        <p:nvPicPr>
+          <p:cNvPr id="7" name="Picture 6">
+            <a:extLst>
+              <a:ext uri="{FF2B5EF4-FFF2-40B4-BE49-F238E27FC236}">
+                <a16:creationId xmlns:a16="http://schemas.microsoft.com/office/drawing/2014/main" id="{A62F32F5-3067-4763-9514-722F521596CF}"/>
+              </a:ext>
+            </a:extLst>
+          </p:cNvPr>
+          <p:cNvPicPr>
+            <a:picLocks noChangeAspect="1"/>
+          </p:cNvPicPr>
+          <p:nvPr/>
+        </p:nvPicPr>
+        <p:blipFill>
+          <a:blip r:embed="rId2"/>
+          <a:stretch>
+            <a:fillRect/>
+          </a:stretch>
+        </p:blipFill>
+        <p:spPr>
+          <a:xfrm>
+            <a:off x="215772" y="1930400"/>
+            <a:ext cx="9403330" cy="2121483"/>
+          </a:xfrm>
+          <a:prstGeom prst="rect">
+            <a:avLst/>
+          </a:prstGeom>
+        </p:spPr>
+      </p:pic>
+    </p:spTree>
+    <p:extLst>
+      <p:ext uri="{BB962C8B-B14F-4D97-AF65-F5344CB8AC3E}">
+        <p14:creationId xmlns:p14="http://schemas.microsoft.com/office/powerpoint/2010/main" val="1889162939"/>
+      </p:ext>
+    </p:extLst>
+  </p:cSld>
+  <p:clrMapOvr>
+    <a:masterClrMapping/>
+  </p:clrMapOvr>
+</p:sld>
+</file>
+
+<file path=ppt/slides/slide24.xml><?xml version="1.0" encoding="utf-8"?>
+<p:sld xmlns:a="http://schemas.openxmlformats.org/drawingml/2006/main" xmlns:r="http://schemas.openxmlformats.org/officeDocument/2006/relationships" xmlns:p="http://schemas.openxmlformats.org/presentationml/2006/main">
+  <p:cSld>
+    <p:spTree>
+      <p:nvGrpSpPr>
+        <p:cNvPr id="1" name=""/>
+        <p:cNvGrpSpPr/>
+        <p:nvPr/>
+      </p:nvGrpSpPr>
+      <p:grpSpPr>
+        <a:xfrm>
+          <a:off x="0" y="0"/>
+          <a:ext cx="0" cy="0"/>
+          <a:chOff x="0" y="0"/>
+          <a:chExt cx="0" cy="0"/>
+        </a:xfrm>
+      </p:grpSpPr>
+      <p:sp>
+        <p:nvSpPr>
+          <p:cNvPr id="2" name="Title 1">
+            <a:extLst>
+              <a:ext uri="{FF2B5EF4-FFF2-40B4-BE49-F238E27FC236}">
+                <a16:creationId xmlns:a16="http://schemas.microsoft.com/office/drawing/2014/main" id="{EF8EB9E3-ADAA-4D6C-9F1D-BE1D244915C5}"/>
+              </a:ext>
+            </a:extLst>
+          </p:cNvPr>
+          <p:cNvSpPr>
+            <a:spLocks noGrp="1"/>
+          </p:cNvSpPr>
+          <p:nvPr>
+            <p:ph type="title"/>
+          </p:nvPr>
+        </p:nvSpPr>
+        <p:spPr/>
+        <p:txBody>
+          <a:bodyPr/>
+          <a:lstStyle/>
+          <a:p>
+            <a:r>
+              <a:rPr lang="en-MY" dirty="0"/>
+              <a:t>Contributions</a:t>
+            </a:r>
+          </a:p>
+        </p:txBody>
+      </p:sp>
+      <p:sp>
+        <p:nvSpPr>
+          <p:cNvPr id="3" name="Content Placeholder 2">
+            <a:extLst>
+              <a:ext uri="{FF2B5EF4-FFF2-40B4-BE49-F238E27FC236}">
+                <a16:creationId xmlns:a16="http://schemas.microsoft.com/office/drawing/2014/main" id="{C5518FFE-CD7C-49A5-B5C6-324FC9F30D6A}"/>
+              </a:ext>
+            </a:extLst>
+          </p:cNvPr>
+          <p:cNvSpPr>
+            <a:spLocks noGrp="1"/>
+          </p:cNvSpPr>
+          <p:nvPr>
+            <p:ph idx="1"/>
+          </p:nvPr>
+        </p:nvSpPr>
+        <p:spPr/>
+        <p:txBody>
+          <a:bodyPr>
+            <a:normAutofit fontScale="92500" lnSpcReduction="20000"/>
+          </a:bodyPr>
+          <a:lstStyle/>
+          <a:p>
+            <a:r>
+              <a:rPr lang="en-MY" sz="2000" dirty="0"/>
+              <a:t>KAR CHUN TEONG</a:t>
+            </a:r>
+          </a:p>
+          <a:p>
+            <a:pPr lvl="1"/>
+            <a:r>
+              <a:rPr lang="en-MY" altLang="zh-CN" sz="2000" dirty="0"/>
+              <a:t>Production management(organization and distribution of workload, arrangement of meeting schedule, etc.)</a:t>
+            </a:r>
+          </a:p>
+          <a:p>
+            <a:pPr lvl="1"/>
+            <a:r>
+              <a:rPr lang="en-MY" sz="2000" dirty="0"/>
+              <a:t>Research and implementation of </a:t>
+            </a:r>
+            <a:r>
+              <a:rPr lang="en-MY" sz="2000" dirty="0" err="1"/>
+              <a:t>DMRNets</a:t>
+            </a:r>
+            <a:r>
+              <a:rPr lang="en-MY" sz="2000" dirty="0"/>
+              <a:t>(FCN) model</a:t>
+            </a:r>
+          </a:p>
+          <a:p>
+            <a:pPr lvl="1"/>
+            <a:r>
+              <a:rPr lang="en-MY" sz="2000" dirty="0"/>
+              <a:t>Design, creation, and compilation of final report and PPT</a:t>
+            </a:r>
+          </a:p>
+          <a:p>
+            <a:r>
+              <a:rPr lang="en-MY" altLang="zh-CN" sz="2000" dirty="0"/>
+              <a:t>MATSUNAGA TAKEHIRO</a:t>
+            </a:r>
+          </a:p>
+          <a:p>
+            <a:pPr lvl="1"/>
+            <a:r>
+              <a:rPr lang="en-MY" altLang="zh-CN" sz="2000" dirty="0"/>
+              <a:t>Implementation of LSTM model</a:t>
+            </a:r>
+          </a:p>
+          <a:p>
+            <a:pPr lvl="1"/>
+            <a:r>
+              <a:rPr lang="en-MY" altLang="zh-CN" sz="2000" dirty="0"/>
+              <a:t>Training and testing of LSTM model</a:t>
+            </a:r>
+          </a:p>
+          <a:p>
+            <a:r>
+              <a:rPr lang="en-MY" altLang="zh-CN" sz="2000" dirty="0"/>
+              <a:t>EDUARDO</a:t>
+            </a:r>
+            <a:r>
+              <a:rPr lang="zh-CN" altLang="en-US" sz="2000" dirty="0"/>
+              <a:t> </a:t>
+            </a:r>
+            <a:r>
+              <a:rPr lang="en-MY" altLang="zh-CN" sz="2000" dirty="0"/>
+              <a:t>WANG</a:t>
+            </a:r>
+            <a:r>
+              <a:rPr lang="zh-CN" altLang="en-US" sz="2000" dirty="0"/>
+              <a:t> </a:t>
+            </a:r>
+            <a:r>
+              <a:rPr lang="en-MY" altLang="zh-CN" sz="2000" dirty="0"/>
+              <a:t>ZHENG</a:t>
+            </a:r>
+          </a:p>
+          <a:p>
+            <a:pPr lvl="1"/>
+            <a:r>
+              <a:rPr lang="en-MY" altLang="zh-CN" sz="1800" dirty="0"/>
+              <a:t>Implementation of </a:t>
+            </a:r>
+            <a:r>
+              <a:rPr lang="en-MY" altLang="zh-CN" sz="1800" dirty="0" err="1"/>
+              <a:t>DMRNets</a:t>
+            </a:r>
+            <a:r>
+              <a:rPr lang="en-MY" sz="1800" dirty="0"/>
+              <a:t>(FCN)</a:t>
+            </a:r>
+            <a:r>
+              <a:rPr lang="en-MY" altLang="zh-CN" sz="1800" dirty="0"/>
+              <a:t> model</a:t>
+            </a:r>
+          </a:p>
+          <a:p>
+            <a:pPr lvl="1"/>
+            <a:r>
+              <a:rPr lang="en-MY" altLang="zh-CN" sz="1800" dirty="0"/>
+              <a:t>Training and testing of </a:t>
+            </a:r>
+            <a:r>
+              <a:rPr lang="en-MY" altLang="zh-CN" sz="1800" dirty="0" err="1"/>
+              <a:t>DMRNets</a:t>
+            </a:r>
+            <a:r>
+              <a:rPr lang="en-MY" sz="1800" dirty="0"/>
+              <a:t>(FCN)</a:t>
+            </a:r>
+            <a:r>
+              <a:rPr lang="en-MY" altLang="zh-CN" sz="1800" dirty="0"/>
+              <a:t> model</a:t>
+            </a:r>
+          </a:p>
+          <a:p>
+            <a:pPr lvl="1"/>
+            <a:endParaRPr lang="en-MY" dirty="0"/>
+          </a:p>
+        </p:txBody>
+      </p:sp>
+    </p:spTree>
+    <p:extLst>
+      <p:ext uri="{BB962C8B-B14F-4D97-AF65-F5344CB8AC3E}">
+        <p14:creationId xmlns:p14="http://schemas.microsoft.com/office/powerpoint/2010/main" val="634147495"/>
+      </p:ext>
+    </p:extLst>
+  </p:cSld>
+  <p:clrMapOvr>
+    <a:masterClrMapping/>
+  </p:clrMapOvr>
+</p:sld>
+</file>
+
+<file path=ppt/slides/slide25.xml><?xml version="1.0" encoding="utf-8"?>
+<p:sld xmlns:a="http://schemas.openxmlformats.org/drawingml/2006/main" xmlns:r="http://schemas.openxmlformats.org/officeDocument/2006/relationships" xmlns:p="http://schemas.openxmlformats.org/presentationml/2006/main">
+  <p:cSld>
+    <p:spTree>
+      <p:nvGrpSpPr>
+        <p:cNvPr id="1" name=""/>
+        <p:cNvGrpSpPr/>
+        <p:nvPr/>
+      </p:nvGrpSpPr>
+      <p:grpSpPr>
+        <a:xfrm>
+          <a:off x="0" y="0"/>
+          <a:ext cx="0" cy="0"/>
+          <a:chOff x="0" y="0"/>
+          <a:chExt cx="0" cy="0"/>
+        </a:xfrm>
+      </p:grpSpPr>
+      <p:sp>
+        <p:nvSpPr>
+          <p:cNvPr id="2" name="Title 1">
+            <a:extLst>
+              <a:ext uri="{FF2B5EF4-FFF2-40B4-BE49-F238E27FC236}">
                 <a16:creationId xmlns:a16="http://schemas.microsoft.com/office/drawing/2014/main" id="{13EBCDCC-AC0E-4224-98FD-2780A74AE843}"/>
               </a:ext>
             </a:extLst>
@@ -7427,10 +8004,9 @@
           <a:lstStyle/>
           <a:p>
             <a:r>
-              <a:rPr lang="en-MY" altLang="zh-CN" dirty="0"/>
-              <a:t>Thank you for listening!</a:t>
-            </a:r>
-            <a:endParaRPr lang="en-MY" dirty="0"/>
+              <a:rPr lang="en-MY" sz="4800" dirty="0"/>
+              <a:t>Conclusion</a:t>
+            </a:r>
           </a:p>
         </p:txBody>
       </p:sp>
@@ -7452,12 +8028,98 @@
         </p:nvSpPr>
         <p:spPr/>
         <p:txBody>
+          <a:bodyPr>
+            <a:normAutofit/>
+          </a:bodyPr>
+          <a:lstStyle/>
+          <a:p>
+            <a:endParaRPr lang="en-MY" sz="3200" dirty="0"/>
+          </a:p>
+        </p:txBody>
+      </p:sp>
+    </p:spTree>
+    <p:extLst>
+      <p:ext uri="{BB962C8B-B14F-4D97-AF65-F5344CB8AC3E}">
+        <p14:creationId xmlns:p14="http://schemas.microsoft.com/office/powerpoint/2010/main" val="3286516000"/>
+      </p:ext>
+    </p:extLst>
+  </p:cSld>
+  <p:clrMapOvr>
+    <a:masterClrMapping/>
+  </p:clrMapOvr>
+</p:sld>
+</file>
+
+<file path=ppt/slides/slide26.xml><?xml version="1.0" encoding="utf-8"?>
+<p:sld xmlns:a="http://schemas.openxmlformats.org/drawingml/2006/main" xmlns:r="http://schemas.openxmlformats.org/officeDocument/2006/relationships" xmlns:p="http://schemas.openxmlformats.org/presentationml/2006/main">
+  <p:cSld>
+    <p:spTree>
+      <p:nvGrpSpPr>
+        <p:cNvPr id="1" name=""/>
+        <p:cNvGrpSpPr/>
+        <p:nvPr/>
+      </p:nvGrpSpPr>
+      <p:grpSpPr>
+        <a:xfrm>
+          <a:off x="0" y="0"/>
+          <a:ext cx="0" cy="0"/>
+          <a:chOff x="0" y="0"/>
+          <a:chExt cx="0" cy="0"/>
+        </a:xfrm>
+      </p:grpSpPr>
+      <p:sp>
+        <p:nvSpPr>
+          <p:cNvPr id="2" name="Title 1">
+            <a:extLst>
+              <a:ext uri="{FF2B5EF4-FFF2-40B4-BE49-F238E27FC236}">
+                <a16:creationId xmlns:a16="http://schemas.microsoft.com/office/drawing/2014/main" id="{13EBCDCC-AC0E-4224-98FD-2780A74AE843}"/>
+              </a:ext>
+            </a:extLst>
+          </p:cNvPr>
+          <p:cNvSpPr>
+            <a:spLocks noGrp="1"/>
+          </p:cNvSpPr>
+          <p:nvPr>
+            <p:ph type="ctrTitle"/>
+          </p:nvPr>
+        </p:nvSpPr>
+        <p:spPr/>
+        <p:txBody>
           <a:bodyPr/>
           <a:lstStyle/>
           <a:p>
             <a:r>
+              <a:rPr lang="en-MY" altLang="zh-CN" dirty="0"/>
+              <a:t>Thank you for listening!</a:t>
+            </a:r>
+            <a:endParaRPr lang="en-MY" dirty="0"/>
+          </a:p>
+        </p:txBody>
+      </p:sp>
+      <p:sp>
+        <p:nvSpPr>
+          <p:cNvPr id="3" name="Subtitle 2">
+            <a:extLst>
+              <a:ext uri="{FF2B5EF4-FFF2-40B4-BE49-F238E27FC236}">
+                <a16:creationId xmlns:a16="http://schemas.microsoft.com/office/drawing/2014/main" id="{C8ACB5B7-FC3C-43ED-BB53-3FBA32F7AAAA}"/>
+              </a:ext>
+            </a:extLst>
+          </p:cNvPr>
+          <p:cNvSpPr>
+            <a:spLocks noGrp="1"/>
+          </p:cNvSpPr>
+          <p:nvPr>
+            <p:ph type="subTitle" idx="1"/>
+          </p:nvPr>
+        </p:nvSpPr>
+        <p:spPr/>
+        <p:txBody>
+          <a:bodyPr/>
+          <a:lstStyle/>
+          <a:p>
+            <a:r>
               <a:rPr lang="en-MY" sz="1600" dirty="0"/>
-              <a:t>This presentation is made, designed and brought to you by KAR CHUN TEONG. </a:t>
+              <a:t>This presentation is made and designed by KAR CHUN TEONG. </a:t>
             </a:r>
           </a:p>
         </p:txBody>

</xml_diff>

<commit_message>
last update report and ppt
hopefully it's the last
</commit_message>
<xml_diff>
--- a/518030990014.pptx
+++ b/518030990014.pptx
@@ -30,7 +30,7 @@
     <p:sldId id="295" r:id="rId24"/>
     <p:sldId id="296" r:id="rId25"/>
     <p:sldId id="274" r:id="rId26"/>
-    <p:sldId id="297" r:id="rId27"/>
+    <p:sldId id="299" r:id="rId27"/>
     <p:sldId id="280" r:id="rId28"/>
   </p:sldIdLst>
   <p:sldSz cx="12192000" cy="6858000"/>
@@ -6020,20 +6020,60 @@
           <a:p>
             <a:r>
               <a:rPr lang="en-MY" dirty="0"/>
-              <a:t>First 200 training shards MAP@10: </a:t>
-            </a:r>
-          </a:p>
-          <a:p>
-            <a:r>
-              <a:rPr lang="en-MY" dirty="0"/>
-              <a:t>First 100 validation shards MAP@10:</a:t>
-            </a:r>
-          </a:p>
-          <a:p>
-            <a:r>
-              <a:rPr lang="en-MY" dirty="0"/>
-              <a:t>Whole datasets MAP@10: </a:t>
-            </a:r>
+              <a:t>The training did not converge for unknown reason.</a:t>
+            </a:r>
+          </a:p>
+          <a:p>
+            <a:r>
+              <a:rPr lang="en-US" dirty="0"/>
+              <a:t>What we</a:t>
+            </a:r>
+            <a:r>
+              <a:rPr lang="en-US" dirty="0">
+                <a:effectLst/>
+              </a:rPr>
+              <a:t> tried </a:t>
+            </a:r>
+          </a:p>
+          <a:p>
+            <a:pPr lvl="1"/>
+            <a:r>
+              <a:rPr lang="en-US" dirty="0">
+                <a:effectLst/>
+              </a:rPr>
+              <a:t>modifying various parameters </a:t>
+            </a:r>
+          </a:p>
+          <a:p>
+            <a:pPr lvl="2"/>
+            <a:r>
+              <a:rPr lang="en-US" dirty="0">
+                <a:effectLst/>
+              </a:rPr>
+              <a:t>Epochs, learning rate, etc.</a:t>
+            </a:r>
+          </a:p>
+          <a:p>
+            <a:pPr lvl="1"/>
+            <a:r>
+              <a:rPr lang="en-US" dirty="0">
+                <a:effectLst/>
+              </a:rPr>
+              <a:t>adjusting the depth of the model</a:t>
+            </a:r>
+          </a:p>
+          <a:p>
+            <a:r>
+              <a:rPr lang="en-US" dirty="0"/>
+              <a:t>B</a:t>
+            </a:r>
+            <a:r>
+              <a:rPr lang="en-US" dirty="0">
+                <a:effectLst/>
+              </a:rPr>
+              <a:t>ut in the end it couldn't work. </a:t>
+            </a:r>
+            <a:endParaRPr lang="en-MY" dirty="0"/>
           </a:p>
         </p:txBody>
       </p:sp>
@@ -6723,14 +6763,19 @@
           <a:p>
             <a:r>
               <a:rPr lang="en-MY" dirty="0"/>
-              <a:t>First 200 training shards MAP@10: </a:t>
+              <a:t>First 200 training shards MAP@10: 0.935</a:t>
             </a:r>
           </a:p>
           <a:p>
             <a:r>
               <a:rPr lang="en-MY" dirty="0"/>
-              <a:t>First 100 validation shards MAP@10:</a:t>
-            </a:r>
+              <a:t>First 100 validation shards MAP@10: </a:t>
+            </a:r>
+            <a:r>
+              <a:rPr lang="en-US" altLang="zh-CN" dirty="0"/>
+              <a:t>0.946</a:t>
+            </a:r>
+            <a:endParaRPr lang="en-MY" dirty="0"/>
           </a:p>
           <a:p>
             <a:r>
@@ -7233,14 +7278,19 @@
           <a:p>
             <a:r>
               <a:rPr lang="en-MY" dirty="0"/>
-              <a:t>First 200 training shards MAP@10: </a:t>
+              <a:t>First 200 training shards MAP@10: 0.949</a:t>
             </a:r>
           </a:p>
           <a:p>
             <a:r>
               <a:rPr lang="en-MY" dirty="0"/>
-              <a:t>First 100 validation shards MAP@10:</a:t>
-            </a:r>
+              <a:t>First 100 validation shards MAP@10: 0.96</a:t>
+            </a:r>
+            <a:r>
+              <a:rPr lang="en-US" altLang="zh-CN" dirty="0"/>
+              <a:t>1</a:t>
+            </a:r>
+            <a:endParaRPr lang="en-MY" dirty="0"/>
           </a:p>
           <a:p>
             <a:r>
@@ -7249,7 +7299,7 @@
             </a:r>
             <a:r>
               <a:rPr lang="en-US" altLang="zh-CN" dirty="0"/>
-              <a:t>0.763</a:t>
+              <a:t>0.764</a:t>
             </a:r>
             <a:endParaRPr lang="en-MY" dirty="0"/>
           </a:p>
@@ -8043,7 +8093,7 @@
         <p:spPr/>
         <p:txBody>
           <a:bodyPr>
-            <a:normAutofit fontScale="92500" lnSpcReduction="20000"/>
+            <a:normAutofit fontScale="92500" lnSpcReduction="10000"/>
           </a:bodyPr>
           <a:lstStyle/>
           <a:p>
@@ -8127,38 +8177,7 @@
             <a:pPr lvl="1"/>
             <a:r>
               <a:rPr lang="en-MY" altLang="zh-CN" sz="1800" dirty="0"/>
-              <a:t>Implementation of </a:t>
-            </a:r>
-            <a:r>
-              <a:rPr lang="en-MY" altLang="zh-CN" sz="1800" dirty="0" err="1"/>
-              <a:t>DMRNets</a:t>
-            </a:r>
-            <a:r>
-              <a:rPr lang="en-MY" sz="1800" dirty="0"/>
-              <a:t>(FCN)</a:t>
-            </a:r>
-            <a:r>
-              <a:rPr lang="en-MY" altLang="zh-CN" sz="1800" dirty="0"/>
-              <a:t> model</a:t>
-            </a:r>
-          </a:p>
-          <a:p>
-            <a:pPr lvl="1"/>
-            <a:r>
-              <a:rPr lang="en-MY" altLang="zh-CN" sz="1800" dirty="0"/>
-              <a:t>Training and testing of </a:t>
-            </a:r>
-            <a:r>
-              <a:rPr lang="en-MY" altLang="zh-CN" sz="1800" dirty="0" err="1"/>
-              <a:t>DMRNets</a:t>
-            </a:r>
-            <a:r>
-              <a:rPr lang="en-MY" sz="1800" dirty="0"/>
-              <a:t>(FCN)</a:t>
-            </a:r>
-            <a:r>
-              <a:rPr lang="en-MY" altLang="zh-CN" sz="1800" dirty="0"/>
-              <a:t> model</a:t>
+              <a:t>Research for other models</a:t>
             </a:r>
           </a:p>
           <a:p>
@@ -8202,7 +8221,7 @@
           <p:cNvPr id="2" name="Title 1">
             <a:extLst>
               <a:ext uri="{FF2B5EF4-FFF2-40B4-BE49-F238E27FC236}">
-                <a16:creationId xmlns:a16="http://schemas.microsoft.com/office/drawing/2014/main" id="{13EBCDCC-AC0E-4224-98FD-2780A74AE843}"/>
+                <a16:creationId xmlns:a16="http://schemas.microsoft.com/office/drawing/2014/main" id="{F952F5B1-5064-42F3-925E-73643B32D856}"/>
               </a:ext>
             </a:extLst>
           </p:cNvPr>
@@ -8210,7 +8229,7 @@
             <a:spLocks noGrp="1"/>
           </p:cNvSpPr>
           <p:nvPr>
-            <p:ph type="ctrTitle"/>
+            <p:ph type="title"/>
           </p:nvPr>
         </p:nvSpPr>
         <p:spPr/>
@@ -8219,7 +8238,7 @@
           <a:lstStyle/>
           <a:p>
             <a:r>
-              <a:rPr lang="en-MY" sz="4800" dirty="0"/>
+              <a:rPr lang="en-MY" dirty="0"/>
               <a:t>Conclusion</a:t>
             </a:r>
           </a:p>
@@ -8227,10 +8246,10 @@
       </p:sp>
       <p:sp>
         <p:nvSpPr>
-          <p:cNvPr id="3" name="Subtitle 2">
+          <p:cNvPr id="3" name="Content Placeholder 2">
             <a:extLst>
               <a:ext uri="{FF2B5EF4-FFF2-40B4-BE49-F238E27FC236}">
-                <a16:creationId xmlns:a16="http://schemas.microsoft.com/office/drawing/2014/main" id="{C8ACB5B7-FC3C-43ED-BB53-3FBA32F7AAAA}"/>
+                <a16:creationId xmlns:a16="http://schemas.microsoft.com/office/drawing/2014/main" id="{099EF3A7-8B7B-4278-9E4A-7C8670F82FCB}"/>
               </a:ext>
             </a:extLst>
           </p:cNvPr>
@@ -8238,24 +8257,36 @@
             <a:spLocks noGrp="1"/>
           </p:cNvSpPr>
           <p:nvPr>
-            <p:ph type="subTitle" idx="1"/>
-          </p:nvPr>
-        </p:nvSpPr>
-        <p:spPr/>
-        <p:txBody>
-          <a:bodyPr>
-            <a:normAutofit/>
-          </a:bodyPr>
-          <a:lstStyle/>
-          <a:p>
-            <a:endParaRPr lang="en-MY" sz="3200" dirty="0"/>
+            <p:ph idx="1"/>
+          </p:nvPr>
+        </p:nvSpPr>
+        <p:spPr/>
+        <p:txBody>
+          <a:bodyPr/>
+          <a:lstStyle/>
+          <a:p>
+            <a:r>
+              <a:rPr lang="en-US" dirty="0" err="1">
+                <a:effectLst/>
+              </a:rPr>
+              <a:t>biLSTM</a:t>
+            </a:r>
+            <a:r>
+              <a:rPr lang="en-US" dirty="0">
+                <a:effectLst/>
+              </a:rPr>
+              <a:t> model has the best performance within the models we use.</a:t>
+            </a:r>
+          </a:p>
+          <a:p>
+            <a:endParaRPr lang="en-MY" dirty="0"/>
           </a:p>
         </p:txBody>
       </p:sp>
     </p:spTree>
     <p:extLst>
       <p:ext uri="{BB962C8B-B14F-4D97-AF65-F5344CB8AC3E}">
-        <p14:creationId xmlns:p14="http://schemas.microsoft.com/office/powerpoint/2010/main" val="3286516000"/>
+        <p14:creationId xmlns:p14="http://schemas.microsoft.com/office/powerpoint/2010/main" val="2587559240"/>
       </p:ext>
     </p:extLst>
   </p:cSld>
@@ -8417,7 +8448,7 @@
         <p:spPr/>
         <p:txBody>
           <a:bodyPr>
-            <a:normAutofit fontScale="47500" lnSpcReduction="20000"/>
+            <a:normAutofit fontScale="85000" lnSpcReduction="20000"/>
           </a:bodyPr>
           <a:lstStyle/>
           <a:p>
@@ -8430,13 +8461,7 @@
           <a:p>
             <a:r>
               <a:rPr lang="en-MY" sz="3200" dirty="0"/>
-              <a:t>*Analysed by KAR CHUN TEONG</a:t>
-            </a:r>
-          </a:p>
-          <a:p>
-            <a:r>
-              <a:rPr lang="en-MY" sz="3200" dirty="0"/>
-              <a:t>Implemented by KAR CHUN TEONG and EDUARDO WANG ZHENG</a:t>
+              <a:t>Analysed and implemented by KAR CHUN TEONG</a:t>
             </a:r>
           </a:p>
         </p:txBody>

</xml_diff>